<commit_message>
Changing makarow2 and 22 presentations
</commit_message>
<xml_diff>
--- a/22.pptx
+++ b/22.pptx
@@ -2,7 +2,7 @@
 <file path=ppt/presentation.xml><?xml version="1.0" encoding="utf-8"?>
 <p:presentation xmlns:a="http://schemas.openxmlformats.org/drawingml/2006/main" xmlns:r="http://schemas.openxmlformats.org/officeDocument/2006/relationships" xmlns:p="http://schemas.openxmlformats.org/presentationml/2006/main" saveSubsetFonts="1">
   <p:sldMasterIdLst>
-    <p:sldMasterId id="2147483672" r:id="rId1"/>
+    <p:sldMasterId id="2147483684" r:id="rId1"/>
   </p:sldMasterIdLst>
   <p:sldIdLst>
     <p:sldId id="256" r:id="rId2"/>
@@ -108,7 +108,7 @@
 </file>
 
 <file path=ppt/slideLayouts/slideLayout1.xml><?xml version="1.0" encoding="utf-8"?>
-<p:sldLayout xmlns:a="http://schemas.openxmlformats.org/drawingml/2006/main" xmlns:r="http://schemas.openxmlformats.org/officeDocument/2006/relationships" xmlns:p="http://schemas.openxmlformats.org/presentationml/2006/main" showMasterSp="0" type="title" preserve="1">
+<p:sldLayout xmlns:a="http://schemas.openxmlformats.org/drawingml/2006/main" xmlns:r="http://schemas.openxmlformats.org/officeDocument/2006/relationships" xmlns:p="http://schemas.openxmlformats.org/presentationml/2006/main" type="title" preserve="1">
   <p:cSld name="Титульный слайд">
     <p:bg>
       <p:bgRef idx="1002">
@@ -131,85 +131,67 @@
       </p:grpSpPr>
       <p:sp>
         <p:nvSpPr>
-          <p:cNvPr id="9" name="Прямоугольник 8"/>
-          <p:cNvSpPr/>
-          <p:nvPr/>
-        </p:nvSpPr>
-        <p:spPr bwMode="ltGray">
+          <p:cNvPr id="9" name="Заголовок 8"/>
+          <p:cNvSpPr>
+            <a:spLocks noGrp="1"/>
+          </p:cNvSpPr>
+          <p:nvPr>
+            <p:ph type="ctrTitle"/>
+          </p:nvPr>
+        </p:nvSpPr>
+        <p:spPr>
           <a:xfrm>
-            <a:off x="0" y="0"/>
-            <a:ext cx="9143999" cy="5135430"/>
+            <a:off x="533400" y="1371600"/>
+            <a:ext cx="7851648" cy="1828800"/>
           </a:xfrm>
-          <a:prstGeom prst="rect">
-            <a:avLst/>
-          </a:prstGeom>
-          <a:solidFill>
-            <a:srgbClr val="000000"/>
-          </a:solidFill>
-          <a:ln w="48000" cap="flat" cmpd="thickThin" algn="ctr">
+          <a:ln>
             <a:noFill/>
-            <a:prstDash val="solid"/>
           </a:ln>
         </p:spPr>
-        <p:style>
-          <a:lnRef idx="2">
-            <a:schemeClr val="accent1"/>
-          </a:lnRef>
-          <a:fillRef idx="1">
-            <a:schemeClr val="accent1"/>
-          </a:fillRef>
-          <a:effectRef idx="0">
-            <a:schemeClr val="accent1"/>
-          </a:effectRef>
-          <a:fontRef idx="minor">
-            <a:schemeClr val="lt1"/>
-          </a:fontRef>
-        </p:style>
-        <p:txBody>
-          <a:bodyPr rtlCol="0" anchor="ctr"/>
-          <a:lstStyle>
-            <a:extLst/>
-          </a:lstStyle>
-          <a:p>
-            <a:pPr algn="ctr" eaLnBrk="1" latinLnBrk="0" hangingPunct="1"/>
-            <a:endParaRPr kumimoji="0" lang="en-US"/>
-          </a:p>
-        </p:txBody>
-      </p:sp>
-      <p:sp>
-        <p:nvSpPr>
-          <p:cNvPr id="2" name="Заголовок 1"/>
-          <p:cNvSpPr>
-            <a:spLocks noGrp="1"/>
-          </p:cNvSpPr>
-          <p:nvPr>
-            <p:ph type="ctrTitle"/>
-          </p:nvPr>
-        </p:nvSpPr>
-        <p:spPr>
-          <a:xfrm>
-            <a:off x="685800" y="3355848"/>
-            <a:ext cx="8077200" cy="1673352"/>
-          </a:xfrm>
-        </p:spPr>
-        <p:txBody>
-          <a:bodyPr vert="horz" lIns="91440" tIns="0" rIns="45720" bIns="0" rtlCol="0" anchor="t">
+        <p:txBody>
+          <a:bodyPr vert="horz" tIns="0" rIns="18288" bIns="0" anchor="b">
             <a:normAutofit/>
             <a:scene3d>
               <a:camera prst="orthographicFront"/>
-              <a:lightRig rig="threePt" dir="t">
-                <a:rot lat="0" lon="0" rev="4800000"/>
+              <a:lightRig rig="freezing" dir="t">
+                <a:rot lat="0" lon="0" rev="5640000"/>
               </a:lightRig>
             </a:scene3d>
-            <a:sp3d prstMaterial="matte">
-              <a:bevelT w="50800" h="10160"/>
+            <a:sp3d prstMaterial="flat">
+              <a:bevelT w="38100" h="38100"/>
+              <a:contourClr>
+                <a:schemeClr val="tx2"/>
+              </a:contourClr>
             </a:sp3d>
           </a:bodyPr>
           <a:lstStyle>
-            <a:lvl1pPr algn="l">
-              <a:defRPr sz="4700" b="1"/>
+            <a:lvl1pPr algn="r" rtl="0">
+              <a:spcBef>
+                <a:spcPct val="0"/>
+              </a:spcBef>
+              <a:buNone/>
+              <a:defRPr sz="5600" b="1">
+                <a:ln>
+                  <a:noFill/>
+                </a:ln>
+                <a:solidFill>
+                  <a:schemeClr val="accent3">
+                    <a:tint val="90000"/>
+                    <a:satMod val="120000"/>
+                  </a:schemeClr>
+                </a:solidFill>
+                <a:effectLst>
+                  <a:outerShdw blurRad="38100" dist="25400" dir="5400000" algn="tl" rotWithShape="0">
+                    <a:srgbClr val="000000">
+                      <a:alpha val="43000"/>
+                    </a:srgbClr>
+                  </a:outerShdw>
+                </a:effectLst>
+                <a:latin typeface="+mj-lt"/>
+                <a:ea typeface="+mj-ea"/>
+                <a:cs typeface="+mj-cs"/>
+              </a:defRPr>
             </a:lvl1pPr>
-            <a:extLst/>
           </a:lstStyle>
           <a:p>
             <a:r>
@@ -222,7 +204,7 @@
       </p:sp>
       <p:sp>
         <p:nvSpPr>
-          <p:cNvPr id="3" name="Подзаголовок 2"/>
+          <p:cNvPr id="17" name="Подзаголовок 16"/>
           <p:cNvSpPr>
             <a:spLocks noGrp="1"/>
           </p:cNvSpPr>
@@ -232,102 +214,45 @@
         </p:nvSpPr>
         <p:spPr>
           <a:xfrm>
-            <a:off x="685800" y="1828800"/>
-            <a:ext cx="8077200" cy="1499616"/>
+            <a:off x="533400" y="3228536"/>
+            <a:ext cx="7854696" cy="1752600"/>
           </a:xfrm>
         </p:spPr>
         <p:txBody>
-          <a:bodyPr lIns="118872" tIns="0" rIns="45720" bIns="0" anchor="b"/>
+          <a:bodyPr lIns="0" rIns="18288"/>
           <a:lstStyle>
-            <a:lvl1pPr marL="0" indent="0" algn="l">
+            <a:lvl1pPr marL="0" marR="45720" indent="0" algn="r">
               <a:buNone/>
-              <a:defRPr sz="2000">
+              <a:defRPr>
                 <a:solidFill>
-                  <a:srgbClr val="FFFFFF"/>
+                  <a:schemeClr val="tx1"/>
                 </a:solidFill>
               </a:defRPr>
             </a:lvl1pPr>
             <a:lvl2pPr marL="457200" indent="0" algn="ctr">
               <a:buNone/>
-              <a:defRPr>
-                <a:solidFill>
-                  <a:schemeClr val="tx1">
-                    <a:tint val="75000"/>
-                  </a:schemeClr>
-                </a:solidFill>
-              </a:defRPr>
             </a:lvl2pPr>
             <a:lvl3pPr marL="914400" indent="0" algn="ctr">
               <a:buNone/>
-              <a:defRPr>
-                <a:solidFill>
-                  <a:schemeClr val="tx1">
-                    <a:tint val="75000"/>
-                  </a:schemeClr>
-                </a:solidFill>
-              </a:defRPr>
             </a:lvl3pPr>
             <a:lvl4pPr marL="1371600" indent="0" algn="ctr">
               <a:buNone/>
-              <a:defRPr>
-                <a:solidFill>
-                  <a:schemeClr val="tx1">
-                    <a:tint val="75000"/>
-                  </a:schemeClr>
-                </a:solidFill>
-              </a:defRPr>
             </a:lvl4pPr>
             <a:lvl5pPr marL="1828800" indent="0" algn="ctr">
               <a:buNone/>
-              <a:defRPr>
-                <a:solidFill>
-                  <a:schemeClr val="tx1">
-                    <a:tint val="75000"/>
-                  </a:schemeClr>
-                </a:solidFill>
-              </a:defRPr>
             </a:lvl5pPr>
             <a:lvl6pPr marL="2286000" indent="0" algn="ctr">
               <a:buNone/>
-              <a:defRPr>
-                <a:solidFill>
-                  <a:schemeClr val="tx1">
-                    <a:tint val="75000"/>
-                  </a:schemeClr>
-                </a:solidFill>
-              </a:defRPr>
             </a:lvl6pPr>
             <a:lvl7pPr marL="2743200" indent="0" algn="ctr">
               <a:buNone/>
-              <a:defRPr>
-                <a:solidFill>
-                  <a:schemeClr val="tx1">
-                    <a:tint val="75000"/>
-                  </a:schemeClr>
-                </a:solidFill>
-              </a:defRPr>
             </a:lvl7pPr>
             <a:lvl8pPr marL="3200400" indent="0" algn="ctr">
               <a:buNone/>
-              <a:defRPr>
-                <a:solidFill>
-                  <a:schemeClr val="tx1">
-                    <a:tint val="75000"/>
-                  </a:schemeClr>
-                </a:solidFill>
-              </a:defRPr>
             </a:lvl8pPr>
             <a:lvl9pPr marL="3657600" indent="0" algn="ctr">
               <a:buNone/>
-              <a:defRPr>
-                <a:solidFill>
-                  <a:schemeClr val="tx1">
-                    <a:tint val="75000"/>
-                  </a:schemeClr>
-                </a:solidFill>
-              </a:defRPr>
             </a:lvl9pPr>
-            <a:extLst/>
           </a:lstStyle>
           <a:p>
             <a:r>
@@ -340,7 +265,7 @@
       </p:sp>
       <p:sp>
         <p:nvSpPr>
-          <p:cNvPr id="4" name="Дата 3"/>
+          <p:cNvPr id="30" name="Дата 29"/>
           <p:cNvSpPr>
             <a:spLocks noGrp="1"/>
           </p:cNvSpPr>
@@ -364,7 +289,7 @@
       </p:sp>
       <p:sp>
         <p:nvSpPr>
-          <p:cNvPr id="5" name="Нижний колонтитул 4"/>
+          <p:cNvPr id="19" name="Нижний колонтитул 18"/>
           <p:cNvSpPr>
             <a:spLocks noGrp="1"/>
           </p:cNvSpPr>
@@ -383,7 +308,7 @@
       </p:sp>
       <p:sp>
         <p:nvSpPr>
-          <p:cNvPr id="6" name="Номер слайда 5"/>
+          <p:cNvPr id="27" name="Номер слайда 26"/>
           <p:cNvSpPr>
             <a:spLocks noGrp="1"/>
           </p:cNvSpPr>
@@ -402,60 +327,6 @@
               <a:t>‹#›</a:t>
             </a:fld>
             <a:endParaRPr lang="ru-RU"/>
-          </a:p>
-        </p:txBody>
-      </p:sp>
-      <p:sp>
-        <p:nvSpPr>
-          <p:cNvPr id="10" name="Прямоугольник 9"/>
-          <p:cNvSpPr/>
-          <p:nvPr/>
-        </p:nvSpPr>
-        <p:spPr bwMode="invGray">
-          <a:xfrm>
-            <a:off x="0" y="5128334"/>
-            <a:ext cx="9144000" cy="45720"/>
-          </a:xfrm>
-          <a:prstGeom prst="rect">
-            <a:avLst/>
-          </a:prstGeom>
-          <a:solidFill>
-            <a:srgbClr val="FFFFFF"/>
-          </a:solidFill>
-          <a:ln w="48000" cap="flat" cmpd="thickThin" algn="ctr">
-            <a:noFill/>
-            <a:prstDash val="solid"/>
-          </a:ln>
-          <a:effectLst>
-            <a:outerShdw blurRad="31750" dist="10160" dir="5400000" algn="tl" rotWithShape="0">
-              <a:srgbClr val="000000">
-                <a:alpha val="60000"/>
-              </a:srgbClr>
-            </a:outerShdw>
-          </a:effectLst>
-        </p:spPr>
-        <p:style>
-          <a:lnRef idx="2">
-            <a:schemeClr val="accent1"/>
-          </a:lnRef>
-          <a:fillRef idx="1">
-            <a:schemeClr val="accent1"/>
-          </a:fillRef>
-          <a:effectRef idx="0">
-            <a:schemeClr val="accent1"/>
-          </a:effectRef>
-          <a:fontRef idx="minor">
-            <a:schemeClr val="lt1"/>
-          </a:fontRef>
-        </p:style>
-        <p:txBody>
-          <a:bodyPr rtlCol="0" anchor="ctr"/>
-          <a:lstStyle>
-            <a:extLst/>
-          </a:lstStyle>
-          <a:p>
-            <a:pPr algn="ctr" eaLnBrk="1" latinLnBrk="0" hangingPunct="1"/>
-            <a:endParaRPr kumimoji="0" lang="en-US"/>
           </a:p>
         </p:txBody>
       </p:sp>
@@ -497,9 +368,7 @@
         <p:spPr/>
         <p:txBody>
           <a:bodyPr/>
-          <a:lstStyle>
-            <a:extLst/>
-          </a:lstStyle>
+          <a:lstStyle/>
           <a:p>
             <a:r>
               <a:rPr kumimoji="0" lang="ru-RU" smtClean="0"/>
@@ -522,9 +391,7 @@
         <p:spPr/>
         <p:txBody>
           <a:bodyPr vert="eaVert"/>
-          <a:lstStyle>
-            <a:extLst/>
-          </a:lstStyle>
+          <a:lstStyle/>
           <a:p>
             <a:pPr lvl="0" eaLnBrk="1" latinLnBrk="0" hangingPunct="1"/>
             <a:r>
@@ -639,7 +506,7 @@
 </file>
 
 <file path=ppt/slideLayouts/slideLayout11.xml><?xml version="1.0" encoding="utf-8"?>
-<p:sldLayout xmlns:a="http://schemas.openxmlformats.org/drawingml/2006/main" xmlns:r="http://schemas.openxmlformats.org/officeDocument/2006/relationships" xmlns:p="http://schemas.openxmlformats.org/presentationml/2006/main" showMasterSp="0" type="vertTitleAndTx" preserve="1">
+<p:sldLayout xmlns:a="http://schemas.openxmlformats.org/drawingml/2006/main" xmlns:r="http://schemas.openxmlformats.org/officeDocument/2006/relationships" xmlns:p="http://schemas.openxmlformats.org/presentationml/2006/main" type="vertTitleAndTx" preserve="1">
   <p:cSld name="Вертикальный заголовок и текст">
     <p:spTree>
       <p:nvGrpSpPr>
@@ -657,107 +524,6 @@
       </p:grpSpPr>
       <p:sp>
         <p:nvSpPr>
-          <p:cNvPr id="9" name="Прямоугольник 8"/>
-          <p:cNvSpPr/>
-          <p:nvPr/>
-        </p:nvSpPr>
-        <p:spPr bwMode="invGray">
-          <a:xfrm>
-            <a:off x="6598920" y="0"/>
-            <a:ext cx="45720" cy="6858000"/>
-          </a:xfrm>
-          <a:prstGeom prst="rect">
-            <a:avLst/>
-          </a:prstGeom>
-          <a:solidFill>
-            <a:srgbClr val="FFFFFF"/>
-          </a:solidFill>
-          <a:ln w="48000" cap="flat" cmpd="thickThin" algn="ctr">
-            <a:noFill/>
-            <a:prstDash val="solid"/>
-          </a:ln>
-          <a:effectLst>
-            <a:outerShdw blurRad="31750" dist="10160" dir="10800000" algn="tl" rotWithShape="0">
-              <a:srgbClr val="000000">
-                <a:alpha val="60000"/>
-              </a:srgbClr>
-            </a:outerShdw>
-          </a:effectLst>
-        </p:spPr>
-        <p:style>
-          <a:lnRef idx="2">
-            <a:schemeClr val="accent1"/>
-          </a:lnRef>
-          <a:fillRef idx="1">
-            <a:schemeClr val="accent1"/>
-          </a:fillRef>
-          <a:effectRef idx="0">
-            <a:schemeClr val="accent1"/>
-          </a:effectRef>
-          <a:fontRef idx="minor">
-            <a:schemeClr val="lt1"/>
-          </a:fontRef>
-        </p:style>
-        <p:txBody>
-          <a:bodyPr rtlCol="0" anchor="ctr"/>
-          <a:lstStyle>
-            <a:extLst/>
-          </a:lstStyle>
-          <a:p>
-            <a:pPr algn="ctr" eaLnBrk="1" latinLnBrk="0" hangingPunct="1"/>
-            <a:endParaRPr kumimoji="0" lang="en-US"/>
-          </a:p>
-        </p:txBody>
-      </p:sp>
-      <p:sp>
-        <p:nvSpPr>
-          <p:cNvPr id="8" name="Прямоугольник 7"/>
-          <p:cNvSpPr/>
-          <p:nvPr/>
-        </p:nvSpPr>
-        <p:spPr bwMode="ltGray">
-          <a:xfrm>
-            <a:off x="6647687" y="0"/>
-            <a:ext cx="2514601" cy="6858000"/>
-          </a:xfrm>
-          <a:prstGeom prst="rect">
-            <a:avLst/>
-          </a:prstGeom>
-          <a:solidFill>
-            <a:srgbClr val="000000"/>
-          </a:solidFill>
-          <a:ln w="48000" cap="flat" cmpd="thickThin" algn="ctr">
-            <a:noFill/>
-            <a:prstDash val="solid"/>
-          </a:ln>
-        </p:spPr>
-        <p:style>
-          <a:lnRef idx="2">
-            <a:schemeClr val="accent1"/>
-          </a:lnRef>
-          <a:fillRef idx="1">
-            <a:schemeClr val="accent1"/>
-          </a:fillRef>
-          <a:effectRef idx="0">
-            <a:schemeClr val="accent1"/>
-          </a:effectRef>
-          <a:fontRef idx="minor">
-            <a:schemeClr val="lt1"/>
-          </a:fontRef>
-        </p:style>
-        <p:txBody>
-          <a:bodyPr rtlCol="0" anchor="ctr"/>
-          <a:lstStyle>
-            <a:extLst/>
-          </a:lstStyle>
-          <a:p>
-            <a:pPr algn="ctr" eaLnBrk="1" latinLnBrk="0" hangingPunct="1"/>
-            <a:endParaRPr kumimoji="0" lang="en-US"/>
-          </a:p>
-        </p:txBody>
-      </p:sp>
-      <p:sp>
-        <p:nvSpPr>
           <p:cNvPr id="2" name="Вертикальный заголовок 1"/>
           <p:cNvSpPr>
             <a:spLocks noGrp="1"/>
@@ -768,15 +534,13 @@
         </p:nvSpPr>
         <p:spPr>
           <a:xfrm>
-            <a:off x="6781800" y="274640"/>
-            <a:ext cx="1905000" cy="5851525"/>
+            <a:off x="6629400" y="914401"/>
+            <a:ext cx="2057400" cy="5211763"/>
           </a:xfrm>
         </p:spPr>
         <p:txBody>
           <a:bodyPr vert="eaVert"/>
-          <a:lstStyle>
-            <a:extLst/>
-          </a:lstStyle>
+          <a:lstStyle/>
           <a:p>
             <a:r>
               <a:rPr kumimoji="0" lang="ru-RU" smtClean="0"/>
@@ -798,15 +562,13 @@
         </p:nvSpPr>
         <p:spPr>
           <a:xfrm>
-            <a:off x="457200" y="304800"/>
-            <a:ext cx="6019800" cy="5851525"/>
+            <a:off x="457200" y="914401"/>
+            <a:ext cx="6019800" cy="5211763"/>
           </a:xfrm>
         </p:spPr>
         <p:txBody>
           <a:bodyPr vert="eaVert"/>
-          <a:lstStyle>
-            <a:extLst/>
-          </a:lstStyle>
+          <a:lstStyle/>
           <a:p>
             <a:pPr lvl="0" eaLnBrk="1" latinLnBrk="0" hangingPunct="1"/>
             <a:r>
@@ -879,12 +641,7 @@
             <p:ph type="ftr" sz="quarter" idx="11"/>
           </p:nvPr>
         </p:nvSpPr>
-        <p:spPr>
-          <a:xfrm>
-            <a:off x="2640597" y="6377459"/>
-            <a:ext cx="3836404" cy="365125"/>
-          </a:xfrm>
-        </p:spPr>
+        <p:spPr/>
         <p:txBody>
           <a:bodyPr/>
           <a:lstStyle/>
@@ -952,17 +709,10 @@
             <p:ph type="title"/>
           </p:nvPr>
         </p:nvSpPr>
-        <p:spPr>
-          <a:xfrm>
-            <a:off x="457200" y="155448"/>
-            <a:ext cx="8229600" cy="1252728"/>
-          </a:xfrm>
-        </p:spPr>
+        <p:spPr/>
         <p:txBody>
           <a:bodyPr/>
-          <a:lstStyle>
-            <a:extLst/>
-          </a:lstStyle>
+          <a:lstStyle/>
           <a:p>
             <a:r>
               <a:rPr kumimoji="0" lang="ru-RU" smtClean="0"/>
@@ -985,9 +735,7 @@
         <p:spPr/>
         <p:txBody>
           <a:bodyPr/>
-          <a:lstStyle>
-            <a:extLst/>
-          </a:lstStyle>
+          <a:lstStyle/>
           <a:p>
             <a:pPr lvl="0" eaLnBrk="1" latinLnBrk="0" hangingPunct="1"/>
             <a:r>
@@ -1102,7 +850,7 @@
 </file>
 
 <file path=ppt/slideLayouts/slideLayout3.xml><?xml version="1.0" encoding="utf-8"?>
-<p:sldLayout xmlns:a="http://schemas.openxmlformats.org/drawingml/2006/main" xmlns:r="http://schemas.openxmlformats.org/officeDocument/2006/relationships" xmlns:p="http://schemas.openxmlformats.org/presentationml/2006/main" showMasterSp="0" type="secHead" preserve="1">
+<p:sldLayout xmlns:a="http://schemas.openxmlformats.org/drawingml/2006/main" xmlns:r="http://schemas.openxmlformats.org/officeDocument/2006/relationships" xmlns:p="http://schemas.openxmlformats.org/presentationml/2006/main" type="secHead" preserve="1">
   <p:cSld name="Заголовок раздела">
     <p:bg>
       <p:bgRef idx="1002">
@@ -1125,139 +873,64 @@
       </p:grpSpPr>
       <p:sp>
         <p:nvSpPr>
-          <p:cNvPr id="9" name="Прямоугольник 8"/>
-          <p:cNvSpPr/>
-          <p:nvPr/>
-        </p:nvSpPr>
-        <p:spPr bwMode="ltGray">
+          <p:cNvPr id="2" name="Заголовок 1"/>
+          <p:cNvSpPr>
+            <a:spLocks noGrp="1"/>
+          </p:cNvSpPr>
+          <p:nvPr>
+            <p:ph type="title"/>
+          </p:nvPr>
+        </p:nvSpPr>
+        <p:spPr>
           <a:xfrm>
-            <a:off x="0" y="1"/>
-            <a:ext cx="9144000" cy="2602520"/>
+            <a:off x="530352" y="1316736"/>
+            <a:ext cx="7772400" cy="1362456"/>
           </a:xfrm>
-          <a:prstGeom prst="rect">
-            <a:avLst/>
-          </a:prstGeom>
-          <a:solidFill>
-            <a:srgbClr val="000000"/>
-          </a:solidFill>
-          <a:ln w="48000" cap="flat" cmpd="thickThin" algn="ctr">
+          <a:ln>
             <a:noFill/>
-            <a:prstDash val="solid"/>
           </a:ln>
         </p:spPr>
-        <p:style>
-          <a:lnRef idx="2">
-            <a:schemeClr val="accent1"/>
-          </a:lnRef>
-          <a:fillRef idx="1">
-            <a:schemeClr val="accent1"/>
-          </a:fillRef>
-          <a:effectRef idx="0">
-            <a:schemeClr val="accent1"/>
-          </a:effectRef>
-          <a:fontRef idx="minor">
-            <a:schemeClr val="lt1"/>
-          </a:fontRef>
-        </p:style>
-        <p:txBody>
-          <a:bodyPr rtlCol="0" anchor="ctr"/>
-          <a:lstStyle>
-            <a:extLst/>
-          </a:lstStyle>
-          <a:p>
-            <a:pPr algn="ctr" eaLnBrk="1" latinLnBrk="0" hangingPunct="1"/>
-            <a:endParaRPr kumimoji="0" lang="en-US"/>
-          </a:p>
-        </p:txBody>
-      </p:sp>
-      <p:sp>
-        <p:nvSpPr>
-          <p:cNvPr id="12" name="Прямоугольник 11"/>
-          <p:cNvSpPr/>
-          <p:nvPr/>
-        </p:nvSpPr>
-        <p:spPr bwMode="invGray">
-          <a:xfrm>
-            <a:off x="0" y="2602520"/>
-            <a:ext cx="9144000" cy="45720"/>
-          </a:xfrm>
-          <a:prstGeom prst="rect">
-            <a:avLst/>
-          </a:prstGeom>
-          <a:solidFill>
-            <a:srgbClr val="FFFFFF"/>
-          </a:solidFill>
-          <a:ln w="48000" cap="flat" cmpd="thickThin" algn="ctr">
-            <a:noFill/>
-            <a:prstDash val="solid"/>
-          </a:ln>
-          <a:effectLst>
-            <a:outerShdw blurRad="31750" dist="10160" dir="5400000" algn="tl" rotWithShape="0">
-              <a:srgbClr val="000000">
-                <a:alpha val="60000"/>
-              </a:srgbClr>
-            </a:outerShdw>
-          </a:effectLst>
-        </p:spPr>
-        <p:style>
-          <a:lnRef idx="2">
-            <a:schemeClr val="accent1"/>
-          </a:lnRef>
-          <a:fillRef idx="1">
-            <a:schemeClr val="accent1"/>
-          </a:fillRef>
-          <a:effectRef idx="0">
-            <a:schemeClr val="accent1"/>
-          </a:effectRef>
-          <a:fontRef idx="minor">
-            <a:schemeClr val="lt1"/>
-          </a:fontRef>
-        </p:style>
-        <p:txBody>
-          <a:bodyPr rtlCol="0" anchor="ctr"/>
-          <a:lstStyle>
-            <a:extLst/>
-          </a:lstStyle>
-          <a:p>
-            <a:pPr algn="ctr" eaLnBrk="1" latinLnBrk="0" hangingPunct="1"/>
-            <a:endParaRPr kumimoji="0" lang="en-US"/>
-          </a:p>
-        </p:txBody>
-      </p:sp>
-      <p:sp>
-        <p:nvSpPr>
-          <p:cNvPr id="2" name="Заголовок 1"/>
-          <p:cNvSpPr>
-            <a:spLocks noGrp="1"/>
-          </p:cNvSpPr>
-          <p:nvPr>
-            <p:ph type="title"/>
-          </p:nvPr>
-        </p:nvSpPr>
-        <p:spPr>
-          <a:xfrm>
-            <a:off x="749808" y="118872"/>
-            <a:ext cx="8013192" cy="1636776"/>
-          </a:xfrm>
-        </p:spPr>
-        <p:txBody>
-          <a:bodyPr vert="horz" lIns="91440" tIns="0" rIns="91440" bIns="0" rtlCol="0" anchor="b">
-            <a:normAutofit/>
+        <p:txBody>
+          <a:bodyPr vert="horz" tIns="0" bIns="0" anchor="b">
+            <a:noAutofit/>
             <a:scene3d>
               <a:camera prst="orthographicFront"/>
-              <a:lightRig rig="threePt" dir="t">
-                <a:rot lat="0" lon="0" rev="4800000"/>
+              <a:lightRig rig="freezing" dir="t">
+                <a:rot lat="0" lon="0" rev="5640000"/>
               </a:lightRig>
             </a:scene3d>
-            <a:sp3d prstMaterial="matte">
-              <a:bevelT w="50800" h="10160"/>
+            <a:sp3d prstMaterial="flat">
+              <a:bevelT w="38100" h="38100"/>
             </a:sp3d>
           </a:bodyPr>
           <a:lstStyle>
-            <a:lvl1pPr algn="l">
-              <a:defRPr sz="4700" b="1" cap="none" baseline="0"/>
+            <a:lvl1pPr algn="l" rtl="0">
+              <a:spcBef>
+                <a:spcPct val="0"/>
+              </a:spcBef>
+              <a:buNone/>
+              <a:defRPr lang="en-US" sz="5600" b="1" cap="none" baseline="0" dirty="0">
+                <a:ln w="635">
+                  <a:noFill/>
+                </a:ln>
+                <a:solidFill>
+                  <a:schemeClr val="accent4">
+                    <a:tint val="90000"/>
+                    <a:satMod val="125000"/>
+                  </a:schemeClr>
+                </a:solidFill>
+                <a:effectLst>
+                  <a:outerShdw blurRad="38100" dist="25400" dir="5400000" algn="tl" rotWithShape="0">
+                    <a:srgbClr val="000000">
+                      <a:alpha val="43000"/>
+                    </a:srgbClr>
+                  </a:outerShdw>
+                </a:effectLst>
+                <a:latin typeface="+mj-lt"/>
+                <a:ea typeface="+mj-ea"/>
+                <a:cs typeface="+mj-cs"/>
+              </a:defRPr>
             </a:lvl1pPr>
-            <a:extLst/>
           </a:lstStyle>
           <a:p>
             <a:r>
@@ -1280,22 +953,22 @@
         </p:nvSpPr>
         <p:spPr>
           <a:xfrm>
-            <a:off x="740664" y="1828800"/>
-            <a:ext cx="8022336" cy="685800"/>
+            <a:off x="530352" y="2704664"/>
+            <a:ext cx="7772400" cy="1509712"/>
           </a:xfrm>
         </p:spPr>
         <p:txBody>
-          <a:bodyPr lIns="146304" tIns="0" rIns="45720" bIns="0" anchor="t"/>
+          <a:bodyPr lIns="45720" rIns="45720" anchor="t"/>
           <a:lstStyle>
             <a:lvl1pPr marL="0" indent="0">
               <a:buNone/>
-              <a:defRPr sz="2000">
+              <a:defRPr sz="2200">
                 <a:solidFill>
-                  <a:srgbClr val="FFFFFF"/>
+                  <a:schemeClr val="tx1"/>
                 </a:solidFill>
               </a:defRPr>
             </a:lvl1pPr>
-            <a:lvl2pPr marL="457200" indent="0">
+            <a:lvl2pPr>
               <a:buNone/>
               <a:defRPr sz="1800">
                 <a:solidFill>
@@ -1305,7 +978,7 @@
                 </a:solidFill>
               </a:defRPr>
             </a:lvl2pPr>
-            <a:lvl3pPr marL="914400" indent="0">
+            <a:lvl3pPr>
               <a:buNone/>
               <a:defRPr sz="1600">
                 <a:solidFill>
@@ -1315,7 +988,7 @@
                 </a:solidFill>
               </a:defRPr>
             </a:lvl3pPr>
-            <a:lvl4pPr marL="1371600" indent="0">
+            <a:lvl4pPr>
               <a:buNone/>
               <a:defRPr sz="1400">
                 <a:solidFill>
@@ -1325,7 +998,7 @@
                 </a:solidFill>
               </a:defRPr>
             </a:lvl4pPr>
-            <a:lvl5pPr marL="1828800" indent="0">
+            <a:lvl5pPr>
               <a:buNone/>
               <a:defRPr sz="1400">
                 <a:solidFill>
@@ -1335,47 +1008,6 @@
                 </a:solidFill>
               </a:defRPr>
             </a:lvl5pPr>
-            <a:lvl6pPr marL="2286000" indent="0">
-              <a:buNone/>
-              <a:defRPr sz="1400">
-                <a:solidFill>
-                  <a:schemeClr val="tx1">
-                    <a:tint val="75000"/>
-                  </a:schemeClr>
-                </a:solidFill>
-              </a:defRPr>
-            </a:lvl6pPr>
-            <a:lvl7pPr marL="2743200" indent="0">
-              <a:buNone/>
-              <a:defRPr sz="1400">
-                <a:solidFill>
-                  <a:schemeClr val="tx1">
-                    <a:tint val="75000"/>
-                  </a:schemeClr>
-                </a:solidFill>
-              </a:defRPr>
-            </a:lvl7pPr>
-            <a:lvl8pPr marL="3200400" indent="0">
-              <a:buNone/>
-              <a:defRPr sz="1400">
-                <a:solidFill>
-                  <a:schemeClr val="tx1">
-                    <a:tint val="75000"/>
-                  </a:schemeClr>
-                </a:solidFill>
-              </a:defRPr>
-            </a:lvl8pPr>
-            <a:lvl9pPr marL="3657600" indent="0">
-              <a:buNone/>
-              <a:defRPr sz="1400">
-                <a:solidFill>
-                  <a:schemeClr val="tx1">
-                    <a:tint val="75000"/>
-                  </a:schemeClr>
-                </a:solidFill>
-              </a:defRPr>
-            </a:lvl9pPr>
-            <a:extLst/>
           </a:lstStyle>
           <a:p>
             <a:pPr lvl="0" eaLnBrk="1" latinLnBrk="0" hangingPunct="1"/>
@@ -1488,42 +1120,45 @@
             <p:ph type="title"/>
           </p:nvPr>
         </p:nvSpPr>
-        <p:spPr/>
+        <p:spPr>
+          <a:xfrm>
+            <a:off x="457200" y="704088"/>
+            <a:ext cx="8229600" cy="1143000"/>
+          </a:xfrm>
+        </p:spPr>
+        <p:txBody>
+          <a:bodyPr/>
+          <a:lstStyle/>
+          <a:p>
+            <a:r>
+              <a:rPr kumimoji="0" lang="ru-RU" smtClean="0"/>
+              <a:t>Образец заголовка</a:t>
+            </a:r>
+            <a:endParaRPr kumimoji="0" lang="en-US"/>
+          </a:p>
+        </p:txBody>
+      </p:sp>
+      <p:sp>
+        <p:nvSpPr>
+          <p:cNvPr id="3" name="Содержимое 2"/>
+          <p:cNvSpPr>
+            <a:spLocks noGrp="1"/>
+          </p:cNvSpPr>
+          <p:nvPr>
+            <p:ph sz="half" idx="1"/>
+          </p:nvPr>
+        </p:nvSpPr>
+        <p:spPr>
+          <a:xfrm>
+            <a:off x="457200" y="1920085"/>
+            <a:ext cx="4038600" cy="4434840"/>
+          </a:xfrm>
+        </p:spPr>
         <p:txBody>
           <a:bodyPr/>
           <a:lstStyle>
-            <a:extLst/>
-          </a:lstStyle>
-          <a:p>
-            <a:r>
-              <a:rPr kumimoji="0" lang="ru-RU" smtClean="0"/>
-              <a:t>Образец заголовка</a:t>
-            </a:r>
-            <a:endParaRPr kumimoji="0" lang="en-US"/>
-          </a:p>
-        </p:txBody>
-      </p:sp>
-      <p:sp>
-        <p:nvSpPr>
-          <p:cNvPr id="3" name="Содержимое 2"/>
-          <p:cNvSpPr>
-            <a:spLocks noGrp="1"/>
-          </p:cNvSpPr>
-          <p:nvPr>
-            <p:ph sz="half" idx="1"/>
-          </p:nvPr>
-        </p:nvSpPr>
-        <p:spPr>
-          <a:xfrm>
-            <a:off x="457200" y="1773936"/>
-            <a:ext cx="4038600" cy="4623816"/>
-          </a:xfrm>
-        </p:spPr>
-        <p:txBody>
-          <a:bodyPr lIns="91440"/>
-          <a:lstStyle>
             <a:lvl1pPr>
-              <a:defRPr sz="2800"/>
+              <a:defRPr sz="2600"/>
             </a:lvl1pPr>
             <a:lvl2pPr>
               <a:defRPr sz="2400"/>
@@ -1537,19 +1172,6 @@
             <a:lvl5pPr>
               <a:defRPr sz="1800"/>
             </a:lvl5pPr>
-            <a:lvl6pPr>
-              <a:defRPr sz="1800"/>
-            </a:lvl6pPr>
-            <a:lvl7pPr>
-              <a:defRPr sz="1800"/>
-            </a:lvl7pPr>
-            <a:lvl8pPr>
-              <a:defRPr sz="1800"/>
-            </a:lvl8pPr>
-            <a:lvl9pPr>
-              <a:defRPr sz="1800"/>
-            </a:lvl9pPr>
-            <a:extLst/>
           </a:lstStyle>
           <a:p>
             <a:pPr lvl="0" eaLnBrk="1" latinLnBrk="0" hangingPunct="1"/>
@@ -1601,15 +1223,15 @@
         </p:nvSpPr>
         <p:spPr>
           <a:xfrm>
-            <a:off x="4648200" y="1773936"/>
-            <a:ext cx="4038600" cy="4623816"/>
+            <a:off x="4648200" y="1920085"/>
+            <a:ext cx="4038600" cy="4434840"/>
           </a:xfrm>
         </p:spPr>
         <p:txBody>
           <a:bodyPr/>
           <a:lstStyle>
             <a:lvl1pPr>
-              <a:defRPr sz="2800"/>
+              <a:defRPr sz="2600"/>
             </a:lvl1pPr>
             <a:lvl2pPr>
               <a:defRPr sz="2400"/>
@@ -1623,19 +1245,6 @@
             <a:lvl5pPr>
               <a:defRPr sz="1800"/>
             </a:lvl5pPr>
-            <a:lvl6pPr>
-              <a:defRPr sz="1800"/>
-            </a:lvl6pPr>
-            <a:lvl7pPr>
-              <a:defRPr sz="1800"/>
-            </a:lvl7pPr>
-            <a:lvl8pPr>
-              <a:defRPr sz="1800"/>
-            </a:lvl8pPr>
-            <a:lvl9pPr>
-              <a:defRPr sz="1800"/>
-            </a:lvl9pPr>
-            <a:extLst/>
           </a:lstStyle>
           <a:p>
             <a:pPr lvl="0" eaLnBrk="1" latinLnBrk="0" hangingPunct="1"/>
@@ -1777,14 +1386,18 @@
             <p:ph type="title"/>
           </p:nvPr>
         </p:nvSpPr>
-        <p:spPr/>
-        <p:txBody>
-          <a:bodyPr/>
+        <p:spPr>
+          <a:xfrm>
+            <a:off x="457200" y="704088"/>
+            <a:ext cx="8229600" cy="1143000"/>
+          </a:xfrm>
+        </p:spPr>
+        <p:txBody>
+          <a:bodyPr tIns="45720" anchor="b"/>
           <a:lstStyle>
             <a:lvl1pPr>
               <a:defRPr/>
             </a:lvl1pPr>
-            <a:extLst/>
           </a:lstStyle>
           <a:p>
             <a:r>
@@ -1807,50 +1420,94 @@
         </p:nvSpPr>
         <p:spPr>
           <a:xfrm>
-            <a:off x="457200" y="1698987"/>
-            <a:ext cx="4040188" cy="715355"/>
+            <a:off x="457200" y="1855248"/>
+            <a:ext cx="4040188" cy="659352"/>
           </a:xfrm>
         </p:spPr>
         <p:txBody>
-          <a:bodyPr lIns="146304" anchor="ctr"/>
+          <a:bodyPr lIns="45720" tIns="0" rIns="45720" bIns="0" anchor="ctr">
+            <a:noAutofit/>
+          </a:bodyPr>
           <a:lstStyle>
             <a:lvl1pPr marL="0" indent="0">
               <a:buNone/>
-              <a:defRPr sz="2300" b="1" cap="all" baseline="0"/>
+              <a:defRPr sz="2400" b="1" cap="none" baseline="0">
+                <a:solidFill>
+                  <a:schemeClr val="tx2"/>
+                </a:solidFill>
+                <a:effectLst/>
+              </a:defRPr>
             </a:lvl1pPr>
-            <a:lvl2pPr marL="457200" indent="0">
+            <a:lvl2pPr>
               <a:buNone/>
               <a:defRPr sz="2000" b="1"/>
             </a:lvl2pPr>
-            <a:lvl3pPr marL="914400" indent="0">
+            <a:lvl3pPr>
               <a:buNone/>
               <a:defRPr sz="1800" b="1"/>
             </a:lvl3pPr>
-            <a:lvl4pPr marL="1371600" indent="0">
+            <a:lvl4pPr>
               <a:buNone/>
               <a:defRPr sz="1600" b="1"/>
             </a:lvl4pPr>
-            <a:lvl5pPr marL="1828800" indent="0">
+            <a:lvl5pPr>
               <a:buNone/>
               <a:defRPr sz="1600" b="1"/>
             </a:lvl5pPr>
-            <a:lvl6pPr marL="2286000" indent="0">
+          </a:lstStyle>
+          <a:p>
+            <a:pPr lvl="0" eaLnBrk="1" latinLnBrk="0" hangingPunct="1"/>
+            <a:r>
+              <a:rPr kumimoji="0" lang="ru-RU" smtClean="0"/>
+              <a:t>Образец текста</a:t>
+            </a:r>
+          </a:p>
+        </p:txBody>
+      </p:sp>
+      <p:sp>
+        <p:nvSpPr>
+          <p:cNvPr id="4" name="Текст 3"/>
+          <p:cNvSpPr>
+            <a:spLocks noGrp="1"/>
+          </p:cNvSpPr>
+          <p:nvPr>
+            <p:ph type="body" sz="half" idx="3"/>
+          </p:nvPr>
+        </p:nvSpPr>
+        <p:spPr>
+          <a:xfrm>
+            <a:off x="4645025" y="1859757"/>
+            <a:ext cx="4041775" cy="654843"/>
+          </a:xfrm>
+        </p:spPr>
+        <p:txBody>
+          <a:bodyPr lIns="45720" tIns="0" rIns="45720" bIns="0" anchor="ctr"/>
+          <a:lstStyle>
+            <a:lvl1pPr marL="0" indent="0">
+              <a:buNone/>
+              <a:defRPr sz="2400" b="1" cap="none" baseline="0">
+                <a:solidFill>
+                  <a:schemeClr val="tx2"/>
+                </a:solidFill>
+                <a:effectLst/>
+              </a:defRPr>
+            </a:lvl1pPr>
+            <a:lvl2pPr>
+              <a:buNone/>
+              <a:defRPr sz="2000" b="1"/>
+            </a:lvl2pPr>
+            <a:lvl3pPr>
+              <a:buNone/>
+              <a:defRPr sz="1800" b="1"/>
+            </a:lvl3pPr>
+            <a:lvl4pPr>
               <a:buNone/>
               <a:defRPr sz="1600" b="1"/>
-            </a:lvl6pPr>
-            <a:lvl7pPr marL="2743200" indent="0">
+            </a:lvl4pPr>
+            <a:lvl5pPr>
               <a:buNone/>
               <a:defRPr sz="1600" b="1"/>
-            </a:lvl7pPr>
-            <a:lvl8pPr marL="3200400" indent="0">
-              <a:buNone/>
-              <a:defRPr sz="1600" b="1"/>
-            </a:lvl8pPr>
-            <a:lvl9pPr marL="3657600" indent="0">
-              <a:buNone/>
-              <a:defRPr sz="1600" b="1"/>
-            </a:lvl9pPr>
-            <a:extLst/>
+            </a:lvl5pPr>
           </a:lstStyle>
           <a:p>
             <a:pPr lvl="0" eaLnBrk="1" latinLnBrk="0" hangingPunct="1"/>
@@ -1863,25 +1520,25 @@
       </p:sp>
       <p:sp>
         <p:nvSpPr>
-          <p:cNvPr id="4" name="Содержимое 3"/>
-          <p:cNvSpPr>
-            <a:spLocks noGrp="1"/>
-          </p:cNvSpPr>
-          <p:nvPr>
-            <p:ph sz="half" idx="2"/>
+          <p:cNvPr id="5" name="Содержимое 4"/>
+          <p:cNvSpPr>
+            <a:spLocks noGrp="1"/>
+          </p:cNvSpPr>
+          <p:nvPr>
+            <p:ph sz="quarter" idx="2"/>
           </p:nvPr>
         </p:nvSpPr>
         <p:spPr>
           <a:xfrm>
-            <a:off x="457200" y="2449512"/>
-            <a:ext cx="4040188" cy="3951288"/>
+            <a:off x="457200" y="2514600"/>
+            <a:ext cx="4040188" cy="3845720"/>
           </a:xfrm>
         </p:spPr>
         <p:txBody>
-          <a:bodyPr/>
+          <a:bodyPr tIns="0"/>
           <a:lstStyle>
             <a:lvl1pPr>
-              <a:defRPr sz="2400"/>
+              <a:defRPr sz="2200"/>
             </a:lvl1pPr>
             <a:lvl2pPr>
               <a:defRPr sz="2000"/>
@@ -1895,19 +1552,6 @@
             <a:lvl5pPr>
               <a:defRPr sz="1600"/>
             </a:lvl5pPr>
-            <a:lvl6pPr>
-              <a:defRPr sz="1600"/>
-            </a:lvl6pPr>
-            <a:lvl7pPr>
-              <a:defRPr sz="1600"/>
-            </a:lvl7pPr>
-            <a:lvl8pPr>
-              <a:defRPr sz="1600"/>
-            </a:lvl8pPr>
-            <a:lvl9pPr>
-              <a:defRPr sz="1600"/>
-            </a:lvl9pPr>
-            <a:extLst/>
           </a:lstStyle>
           <a:p>
             <a:pPr lvl="0" eaLnBrk="1" latinLnBrk="0" hangingPunct="1"/>
@@ -1949,91 +1593,25 @@
       </p:sp>
       <p:sp>
         <p:nvSpPr>
-          <p:cNvPr id="5" name="Текст 4"/>
-          <p:cNvSpPr>
-            <a:spLocks noGrp="1"/>
-          </p:cNvSpPr>
-          <p:nvPr>
-            <p:ph type="body" sz="quarter" idx="3"/>
+          <p:cNvPr id="6" name="Содержимое 5"/>
+          <p:cNvSpPr>
+            <a:spLocks noGrp="1"/>
+          </p:cNvSpPr>
+          <p:nvPr>
+            <p:ph sz="quarter" idx="4"/>
           </p:nvPr>
         </p:nvSpPr>
         <p:spPr>
           <a:xfrm>
-            <a:off x="4645025" y="1698987"/>
-            <a:ext cx="4041775" cy="715355"/>
+            <a:off x="4645025" y="2514600"/>
+            <a:ext cx="4041775" cy="3845720"/>
           </a:xfrm>
         </p:spPr>
         <p:txBody>
-          <a:bodyPr lIns="146304" anchor="ctr"/>
-          <a:lstStyle>
-            <a:lvl1pPr marL="0" indent="0">
-              <a:buNone/>
-              <a:defRPr sz="2300" b="1" cap="all" baseline="0"/>
-            </a:lvl1pPr>
-            <a:lvl2pPr marL="457200" indent="0">
-              <a:buNone/>
-              <a:defRPr sz="2000" b="1"/>
-            </a:lvl2pPr>
-            <a:lvl3pPr marL="914400" indent="0">
-              <a:buNone/>
-              <a:defRPr sz="1800" b="1"/>
-            </a:lvl3pPr>
-            <a:lvl4pPr marL="1371600" indent="0">
-              <a:buNone/>
-              <a:defRPr sz="1600" b="1"/>
-            </a:lvl4pPr>
-            <a:lvl5pPr marL="1828800" indent="0">
-              <a:buNone/>
-              <a:defRPr sz="1600" b="1"/>
-            </a:lvl5pPr>
-            <a:lvl6pPr marL="2286000" indent="0">
-              <a:buNone/>
-              <a:defRPr sz="1600" b="1"/>
-            </a:lvl6pPr>
-            <a:lvl7pPr marL="2743200" indent="0">
-              <a:buNone/>
-              <a:defRPr sz="1600" b="1"/>
-            </a:lvl7pPr>
-            <a:lvl8pPr marL="3200400" indent="0">
-              <a:buNone/>
-              <a:defRPr sz="1600" b="1"/>
-            </a:lvl8pPr>
-            <a:lvl9pPr marL="3657600" indent="0">
-              <a:buNone/>
-              <a:defRPr sz="1600" b="1"/>
-            </a:lvl9pPr>
-            <a:extLst/>
-          </a:lstStyle>
-          <a:p>
-            <a:pPr lvl="0" eaLnBrk="1" latinLnBrk="0" hangingPunct="1"/>
-            <a:r>
-              <a:rPr kumimoji="0" lang="ru-RU" smtClean="0"/>
-              <a:t>Образец текста</a:t>
-            </a:r>
-          </a:p>
-        </p:txBody>
-      </p:sp>
-      <p:sp>
-        <p:nvSpPr>
-          <p:cNvPr id="6" name="Содержимое 5"/>
-          <p:cNvSpPr>
-            <a:spLocks noGrp="1"/>
-          </p:cNvSpPr>
-          <p:nvPr>
-            <p:ph sz="quarter" idx="4"/>
-          </p:nvPr>
-        </p:nvSpPr>
-        <p:spPr>
-          <a:xfrm>
-            <a:off x="4645025" y="2449512"/>
-            <a:ext cx="4041775" cy="3951288"/>
-          </a:xfrm>
-        </p:spPr>
-        <p:txBody>
-          <a:bodyPr/>
+          <a:bodyPr tIns="0"/>
           <a:lstStyle>
             <a:lvl1pPr>
-              <a:defRPr sz="2400"/>
+              <a:defRPr sz="2200"/>
             </a:lvl1pPr>
             <a:lvl2pPr>
               <a:defRPr sz="2000"/>
@@ -2047,19 +1625,6 @@
             <a:lvl5pPr>
               <a:defRPr sz="1600"/>
             </a:lvl5pPr>
-            <a:lvl6pPr>
-              <a:defRPr sz="1600"/>
-            </a:lvl6pPr>
-            <a:lvl7pPr>
-              <a:defRPr sz="1600"/>
-            </a:lvl7pPr>
-            <a:lvl8pPr>
-              <a:defRPr sz="1600"/>
-            </a:lvl8pPr>
-            <a:lvl9pPr>
-              <a:defRPr sz="1600"/>
-            </a:lvl9pPr>
-            <a:extLst/>
           </a:lstStyle>
           <a:p>
             <a:pPr lvl="0" eaLnBrk="1" latinLnBrk="0" hangingPunct="1"/>
@@ -2201,11 +1766,46 @@
             <p:ph type="title"/>
           </p:nvPr>
         </p:nvSpPr>
-        <p:spPr/>
-        <p:txBody>
-          <a:bodyPr/>
+        <p:spPr>
+          <a:xfrm>
+            <a:off x="457200" y="704088"/>
+            <a:ext cx="8305800" cy="1143000"/>
+          </a:xfrm>
+        </p:spPr>
+        <p:txBody>
+          <a:bodyPr vert="horz" tIns="45720" bIns="0" anchor="b">
+            <a:normAutofit/>
+            <a:scene3d>
+              <a:camera prst="orthographicFront"/>
+              <a:lightRig rig="freezing" dir="t">
+                <a:rot lat="0" lon="0" rev="5640000"/>
+              </a:lightRig>
+            </a:scene3d>
+            <a:sp3d prstMaterial="flat">
+              <a:contourClr>
+                <a:schemeClr val="tx2"/>
+              </a:contourClr>
+            </a:sp3d>
+          </a:bodyPr>
           <a:lstStyle>
-            <a:extLst/>
+            <a:lvl1pPr algn="l" rtl="0">
+              <a:spcBef>
+                <a:spcPct val="0"/>
+              </a:spcBef>
+              <a:buNone/>
+              <a:defRPr sz="5000" b="0">
+                <a:ln>
+                  <a:noFill/>
+                </a:ln>
+                <a:solidFill>
+                  <a:schemeClr val="tx2"/>
+                </a:solidFill>
+                <a:effectLst/>
+                <a:latin typeface="+mj-lt"/>
+                <a:ea typeface="+mj-ea"/>
+                <a:cs typeface="+mj-cs"/>
+              </a:defRPr>
+            </a:lvl1pPr>
           </a:lstStyle>
           <a:p>
             <a:r>
@@ -2292,7 +1892,7 @@
 </file>
 
 <file path=ppt/slideLayouts/slideLayout7.xml><?xml version="1.0" encoding="utf-8"?>
-<p:sldLayout xmlns:a="http://schemas.openxmlformats.org/drawingml/2006/main" xmlns:r="http://schemas.openxmlformats.org/officeDocument/2006/relationships" xmlns:p="http://schemas.openxmlformats.org/presentationml/2006/main" showMasterSp="0" type="blank" preserve="1">
+<p:sldLayout xmlns:a="http://schemas.openxmlformats.org/drawingml/2006/main" xmlns:r="http://schemas.openxmlformats.org/officeDocument/2006/relationships" xmlns:p="http://schemas.openxmlformats.org/presentationml/2006/main" type="blank" preserve="1">
   <p:cSld name="Пустой слайд">
     <p:spTree>
       <p:nvGrpSpPr>
@@ -2412,20 +2012,33 @@
         </p:nvSpPr>
         <p:spPr>
           <a:xfrm>
-            <a:off x="167838" y="152400"/>
-            <a:ext cx="2523744" cy="978408"/>
+            <a:off x="685800" y="514352"/>
+            <a:ext cx="2743200" cy="1162050"/>
           </a:xfrm>
         </p:spPr>
         <p:txBody>
-          <a:bodyPr vert="horz" lIns="73152" rIns="45720" bIns="0" rtlCol="0" anchor="b">
-            <a:normAutofit/>
-            <a:sp3d prstMaterial="matte"/>
+          <a:bodyPr lIns="0" anchor="b">
+            <a:noAutofit/>
           </a:bodyPr>
           <a:lstStyle>
-            <a:lvl1pPr algn="l">
-              <a:defRPr sz="2000" b="0"/>
+            <a:lvl1pPr algn="l" rtl="0">
+              <a:spcBef>
+                <a:spcPct val="0"/>
+              </a:spcBef>
+              <a:buNone/>
+              <a:defRPr sz="2600" b="0">
+                <a:ln>
+                  <a:noFill/>
+                </a:ln>
+                <a:solidFill>
+                  <a:schemeClr val="tx2"/>
+                </a:solidFill>
+                <a:effectLst/>
+                <a:latin typeface="+mj-lt"/>
+                <a:ea typeface="+mj-ea"/>
+                <a:cs typeface="+mj-cs"/>
+              </a:defRPr>
             </a:lvl1pPr>
-            <a:extLst/>
           </a:lstStyle>
           <a:p>
             <a:r>
@@ -2438,28 +2051,77 @@
       </p:sp>
       <p:sp>
         <p:nvSpPr>
-          <p:cNvPr id="3" name="Содержимое 2"/>
-          <p:cNvSpPr>
-            <a:spLocks noGrp="1"/>
-          </p:cNvSpPr>
-          <p:nvPr>
-            <p:ph idx="1"/>
+          <p:cNvPr id="3" name="Текст 2"/>
+          <p:cNvSpPr>
+            <a:spLocks noGrp="1"/>
+          </p:cNvSpPr>
+          <p:nvPr>
+            <p:ph type="body" idx="2"/>
           </p:nvPr>
         </p:nvSpPr>
         <p:spPr>
           <a:xfrm>
-            <a:off x="3019377" y="1743133"/>
-            <a:ext cx="5920641" cy="4558885"/>
+            <a:off x="685800" y="1676400"/>
+            <a:ext cx="2743200" cy="4572000"/>
           </a:xfrm>
         </p:spPr>
         <p:txBody>
-          <a:bodyPr/>
+          <a:bodyPr lIns="18288" rIns="18288"/>
+          <a:lstStyle>
+            <a:lvl1pPr marL="0" indent="0" algn="l">
+              <a:buNone/>
+              <a:defRPr sz="1400"/>
+            </a:lvl1pPr>
+            <a:lvl2pPr indent="0" algn="l">
+              <a:buNone/>
+              <a:defRPr sz="1200"/>
+            </a:lvl2pPr>
+            <a:lvl3pPr indent="0" algn="l">
+              <a:buNone/>
+              <a:defRPr sz="1000"/>
+            </a:lvl3pPr>
+            <a:lvl4pPr indent="0" algn="l">
+              <a:buNone/>
+              <a:defRPr sz="900"/>
+            </a:lvl4pPr>
+            <a:lvl5pPr indent="0" algn="l">
+              <a:buNone/>
+              <a:defRPr sz="900"/>
+            </a:lvl5pPr>
+          </a:lstStyle>
+          <a:p>
+            <a:pPr lvl="0" eaLnBrk="1" latinLnBrk="0" hangingPunct="1"/>
+            <a:r>
+              <a:rPr kumimoji="0" lang="ru-RU" smtClean="0"/>
+              <a:t>Образец текста</a:t>
+            </a:r>
+          </a:p>
+        </p:txBody>
+      </p:sp>
+      <p:sp>
+        <p:nvSpPr>
+          <p:cNvPr id="4" name="Содержимое 3"/>
+          <p:cNvSpPr>
+            <a:spLocks noGrp="1"/>
+          </p:cNvSpPr>
+          <p:nvPr>
+            <p:ph sz="half" idx="1"/>
+          </p:nvPr>
+        </p:nvSpPr>
+        <p:spPr>
+          <a:xfrm>
+            <a:off x="3575050" y="1676400"/>
+            <a:ext cx="5111750" cy="4572000"/>
+          </a:xfrm>
+        </p:spPr>
+        <p:txBody>
+          <a:bodyPr tIns="0"/>
           <a:lstStyle>
             <a:lvl1pPr>
-              <a:defRPr sz="3200"/>
+              <a:defRPr sz="2800"/>
             </a:lvl1pPr>
             <a:lvl2pPr>
-              <a:defRPr sz="2800"/>
+              <a:defRPr sz="2600"/>
             </a:lvl2pPr>
             <a:lvl3pPr>
               <a:defRPr sz="2400"/>
@@ -2468,21 +2130,8 @@
               <a:defRPr sz="2000"/>
             </a:lvl4pPr>
             <a:lvl5pPr>
-              <a:defRPr sz="2000"/>
+              <a:defRPr sz="1800"/>
             </a:lvl5pPr>
-            <a:lvl6pPr>
-              <a:defRPr sz="2000"/>
-            </a:lvl6pPr>
-            <a:lvl7pPr>
-              <a:defRPr sz="2000"/>
-            </a:lvl7pPr>
-            <a:lvl8pPr>
-              <a:defRPr sz="2000"/>
-            </a:lvl8pPr>
-            <a:lvl9pPr>
-              <a:defRPr sz="2000"/>
-            </a:lvl9pPr>
-            <a:extLst/>
           </a:lstStyle>
           <a:p>
             <a:pPr lvl="0" eaLnBrk="1" latinLnBrk="0" hangingPunct="1"/>
@@ -2519,72 +2168,6 @@
               <a:t>Пятый уровень</a:t>
             </a:r>
             <a:endParaRPr kumimoji="0" lang="en-US"/>
-          </a:p>
-        </p:txBody>
-      </p:sp>
-      <p:sp>
-        <p:nvSpPr>
-          <p:cNvPr id="4" name="Текст 3"/>
-          <p:cNvSpPr>
-            <a:spLocks noGrp="1"/>
-          </p:cNvSpPr>
-          <p:nvPr>
-            <p:ph type="body" sz="half" idx="2"/>
-          </p:nvPr>
-        </p:nvSpPr>
-        <p:spPr>
-          <a:xfrm>
-            <a:off x="167838" y="1730018"/>
-            <a:ext cx="2468880" cy="4572000"/>
-          </a:xfrm>
-        </p:spPr>
-        <p:txBody>
-          <a:bodyPr/>
-          <a:lstStyle>
-            <a:lvl1pPr marL="0" indent="0">
-              <a:buNone/>
-              <a:defRPr sz="1400"/>
-            </a:lvl1pPr>
-            <a:lvl2pPr marL="457200" indent="0">
-              <a:buNone/>
-              <a:defRPr sz="1200"/>
-            </a:lvl2pPr>
-            <a:lvl3pPr marL="914400" indent="0">
-              <a:buNone/>
-              <a:defRPr sz="1000"/>
-            </a:lvl3pPr>
-            <a:lvl4pPr marL="1371600" indent="0">
-              <a:buNone/>
-              <a:defRPr sz="900"/>
-            </a:lvl4pPr>
-            <a:lvl5pPr marL="1828800" indent="0">
-              <a:buNone/>
-              <a:defRPr sz="900"/>
-            </a:lvl5pPr>
-            <a:lvl6pPr marL="2286000" indent="0">
-              <a:buNone/>
-              <a:defRPr sz="900"/>
-            </a:lvl6pPr>
-            <a:lvl7pPr marL="2743200" indent="0">
-              <a:buNone/>
-              <a:defRPr sz="900"/>
-            </a:lvl7pPr>
-            <a:lvl8pPr marL="3200400" indent="0">
-              <a:buNone/>
-              <a:defRPr sz="900"/>
-            </a:lvl8pPr>
-            <a:lvl9pPr marL="3657600" indent="0">
-              <a:buNone/>
-              <a:defRPr sz="900"/>
-            </a:lvl9pPr>
-            <a:extLst/>
-          </a:lstStyle>
-          <a:p>
-            <a:pPr lvl="0" eaLnBrk="1" latinLnBrk="0" hangingPunct="1"/>
-            <a:r>
-              <a:rPr kumimoji="0" lang="ru-RU" smtClean="0"/>
-              <a:t>Образец текста</a:t>
-            </a:r>
           </a:p>
         </p:txBody>
       </p:sp>
@@ -2652,100 +2235,6 @@
               <a:t>‹#›</a:t>
             </a:fld>
             <a:endParaRPr lang="ru-RU"/>
-          </a:p>
-        </p:txBody>
-      </p:sp>
-      <p:sp>
-        <p:nvSpPr>
-          <p:cNvPr id="12" name="Прямоугольник 11"/>
-          <p:cNvSpPr/>
-          <p:nvPr/>
-        </p:nvSpPr>
-        <p:spPr bwMode="invGray">
-          <a:xfrm>
-            <a:off x="2855737" y="0"/>
-            <a:ext cx="45720" cy="1453896"/>
-          </a:xfrm>
-          <a:prstGeom prst="rect">
-            <a:avLst/>
-          </a:prstGeom>
-          <a:solidFill>
-            <a:srgbClr val="FFFFFF"/>
-          </a:solidFill>
-          <a:ln w="48000" cap="flat" cmpd="thickThin" algn="ctr">
-            <a:noFill/>
-            <a:prstDash val="solid"/>
-          </a:ln>
-        </p:spPr>
-        <p:style>
-          <a:lnRef idx="2">
-            <a:schemeClr val="accent1"/>
-          </a:lnRef>
-          <a:fillRef idx="1">
-            <a:schemeClr val="accent1"/>
-          </a:fillRef>
-          <a:effectRef idx="0">
-            <a:schemeClr val="accent1"/>
-          </a:effectRef>
-          <a:fontRef idx="minor">
-            <a:schemeClr val="lt1"/>
-          </a:fontRef>
-        </p:style>
-        <p:txBody>
-          <a:bodyPr rtlCol="0" anchor="ctr"/>
-          <a:lstStyle>
-            <a:extLst/>
-          </a:lstStyle>
-          <a:p>
-            <a:pPr algn="ctr" eaLnBrk="1" latinLnBrk="0" hangingPunct="1"/>
-            <a:endParaRPr kumimoji="0" lang="en-US"/>
-          </a:p>
-        </p:txBody>
-      </p:sp>
-      <p:sp>
-        <p:nvSpPr>
-          <p:cNvPr id="9" name="Прямоугольник 8"/>
-          <p:cNvSpPr/>
-          <p:nvPr/>
-        </p:nvSpPr>
-        <p:spPr bwMode="invGray">
-          <a:xfrm>
-            <a:off x="2855737" y="0"/>
-            <a:ext cx="45720" cy="1453896"/>
-          </a:xfrm>
-          <a:prstGeom prst="rect">
-            <a:avLst/>
-          </a:prstGeom>
-          <a:solidFill>
-            <a:srgbClr val="FFFFFF"/>
-          </a:solidFill>
-          <a:ln w="48000" cap="flat" cmpd="thickThin" algn="ctr">
-            <a:noFill/>
-            <a:prstDash val="solid"/>
-          </a:ln>
-        </p:spPr>
-        <p:style>
-          <a:lnRef idx="2">
-            <a:schemeClr val="accent1"/>
-          </a:lnRef>
-          <a:fillRef idx="1">
-            <a:schemeClr val="accent1"/>
-          </a:fillRef>
-          <a:effectRef idx="0">
-            <a:schemeClr val="accent1"/>
-          </a:effectRef>
-          <a:fontRef idx="minor">
-            <a:schemeClr val="lt1"/>
-          </a:fontRef>
-        </p:style>
-        <p:txBody>
-          <a:bodyPr rtlCol="0" anchor="ctr"/>
-          <a:lstStyle>
-            <a:extLst/>
-          </a:lstStyle>
-          <a:p>
-            <a:pPr algn="ctr" eaLnBrk="1" latinLnBrk="0" hangingPunct="1"/>
-            <a:endParaRPr kumimoji="0" lang="en-US"/>
           </a:p>
         </p:txBody>
       </p:sp>
@@ -2758,13 +2247,8 @@
 </file>
 
 <file path=ppt/slideLayouts/slideLayout9.xml><?xml version="1.0" encoding="utf-8"?>
-<p:sldLayout xmlns:a="http://schemas.openxmlformats.org/drawingml/2006/main" xmlns:r="http://schemas.openxmlformats.org/officeDocument/2006/relationships" xmlns:p="http://schemas.openxmlformats.org/presentationml/2006/main" type="picTx" preserve="1">
+<p:sldLayout xmlns:a="http://schemas.openxmlformats.org/drawingml/2006/main" xmlns:r="http://schemas.openxmlformats.org/officeDocument/2006/relationships" xmlns:p="http://schemas.openxmlformats.org/presentationml/2006/main" showMasterSp="0" type="picTx" preserve="1">
   <p:cSld name="Рисунок с подписью">
-    <p:bg>
-      <p:bgRef idx="1001">
-        <a:schemeClr val="bg2"/>
-      </p:bgRef>
-    </p:bg>
     <p:spTree>
       <p:nvGrpSpPr>
         <p:cNvPr id="1" name=""/>
@@ -2781,417 +2265,34 @@
       </p:grpSpPr>
       <p:sp>
         <p:nvSpPr>
-          <p:cNvPr id="2" name="Заголовок 1"/>
-          <p:cNvSpPr>
-            <a:spLocks noGrp="1"/>
-          </p:cNvSpPr>
-          <p:nvPr>
-            <p:ph type="title"/>
-          </p:nvPr>
-        </p:nvSpPr>
-        <p:spPr>
-          <a:xfrm>
-            <a:off x="164592" y="155448"/>
-            <a:ext cx="2525150" cy="978408"/>
-          </a:xfrm>
-        </p:spPr>
-        <p:txBody>
-          <a:bodyPr lIns="73152" bIns="0" anchor="b">
-            <a:sp3d prstMaterial="matte"/>
-          </a:bodyPr>
-          <a:lstStyle>
-            <a:lvl1pPr algn="l">
-              <a:defRPr sz="2000" b="0"/>
-            </a:lvl1pPr>
-            <a:extLst/>
-          </a:lstStyle>
-          <a:p>
-            <a:r>
-              <a:rPr kumimoji="0" lang="ru-RU" smtClean="0"/>
-              <a:t>Образец заголовка</a:t>
-            </a:r>
-            <a:endParaRPr kumimoji="0" lang="en-US"/>
-          </a:p>
-        </p:txBody>
-      </p:sp>
-      <p:sp>
-        <p:nvSpPr>
-          <p:cNvPr id="3" name="Рисунок 2"/>
-          <p:cNvSpPr>
-            <a:spLocks noGrp="1"/>
-          </p:cNvSpPr>
-          <p:nvPr>
-            <p:ph type="pic" idx="1"/>
-          </p:nvPr>
-        </p:nvSpPr>
-        <p:spPr>
-          <a:xfrm>
-            <a:off x="2903805" y="1484808"/>
-            <a:ext cx="6247397" cy="5373192"/>
-          </a:xfrm>
-          <a:solidFill>
-            <a:schemeClr val="bg2">
-              <a:shade val="75000"/>
-            </a:schemeClr>
-          </a:solidFill>
-        </p:spPr>
-        <p:txBody>
-          <a:bodyPr/>
-          <a:lstStyle>
-            <a:lvl1pPr marL="0" indent="0">
-              <a:buNone/>
-              <a:defRPr sz="3200"/>
-            </a:lvl1pPr>
-            <a:lvl2pPr marL="457200" indent="0">
-              <a:buNone/>
-              <a:defRPr sz="2800"/>
-            </a:lvl2pPr>
-            <a:lvl3pPr marL="914400" indent="0">
-              <a:buNone/>
-              <a:defRPr sz="2400"/>
-            </a:lvl3pPr>
-            <a:lvl4pPr marL="1371600" indent="0">
-              <a:buNone/>
-              <a:defRPr sz="2000"/>
-            </a:lvl4pPr>
-            <a:lvl5pPr marL="1828800" indent="0">
-              <a:buNone/>
-              <a:defRPr sz="2000"/>
-            </a:lvl5pPr>
-            <a:lvl6pPr marL="2286000" indent="0">
-              <a:buNone/>
-              <a:defRPr sz="2000"/>
-            </a:lvl6pPr>
-            <a:lvl7pPr marL="2743200" indent="0">
-              <a:buNone/>
-              <a:defRPr sz="2000"/>
-            </a:lvl7pPr>
-            <a:lvl8pPr marL="3200400" indent="0">
-              <a:buNone/>
-              <a:defRPr sz="2000"/>
-            </a:lvl8pPr>
-            <a:lvl9pPr marL="3657600" indent="0">
-              <a:buNone/>
-              <a:defRPr sz="2000"/>
-            </a:lvl9pPr>
-            <a:extLst/>
-          </a:lstStyle>
-          <a:p>
-            <a:r>
-              <a:rPr kumimoji="0" lang="ru-RU" smtClean="0"/>
-              <a:t>Вставка рисунка</a:t>
-            </a:r>
-            <a:endParaRPr kumimoji="0" lang="en-US" dirty="0"/>
-          </a:p>
-        </p:txBody>
-      </p:sp>
-      <p:sp>
-        <p:nvSpPr>
-          <p:cNvPr id="4" name="Текст 3"/>
-          <p:cNvSpPr>
-            <a:spLocks noGrp="1"/>
-          </p:cNvSpPr>
-          <p:nvPr>
-            <p:ph type="body" sz="half" idx="2"/>
-          </p:nvPr>
-        </p:nvSpPr>
-        <p:spPr>
-          <a:xfrm>
-            <a:off x="164592" y="1728216"/>
-            <a:ext cx="2468880" cy="4572000"/>
-          </a:xfrm>
-        </p:spPr>
-        <p:txBody>
-          <a:bodyPr/>
-          <a:lstStyle>
-            <a:lvl1pPr marL="0" indent="0">
-              <a:buNone/>
-              <a:defRPr sz="1400"/>
-            </a:lvl1pPr>
-            <a:lvl2pPr marL="457200" indent="0">
-              <a:buNone/>
-              <a:defRPr sz="1200"/>
-            </a:lvl2pPr>
-            <a:lvl3pPr marL="914400" indent="0">
-              <a:buNone/>
-              <a:defRPr sz="1000"/>
-            </a:lvl3pPr>
-            <a:lvl4pPr marL="1371600" indent="0">
-              <a:buNone/>
-              <a:defRPr sz="900"/>
-            </a:lvl4pPr>
-            <a:lvl5pPr marL="1828800" indent="0">
-              <a:buNone/>
-              <a:defRPr sz="900"/>
-            </a:lvl5pPr>
-            <a:lvl6pPr marL="2286000" indent="0">
-              <a:buNone/>
-              <a:defRPr sz="900"/>
-            </a:lvl6pPr>
-            <a:lvl7pPr marL="2743200" indent="0">
-              <a:buNone/>
-              <a:defRPr sz="900"/>
-            </a:lvl7pPr>
-            <a:lvl8pPr marL="3200400" indent="0">
-              <a:buNone/>
-              <a:defRPr sz="900"/>
-            </a:lvl8pPr>
-            <a:lvl9pPr marL="3657600" indent="0">
-              <a:buNone/>
-              <a:defRPr sz="900"/>
-            </a:lvl9pPr>
-            <a:extLst/>
-          </a:lstStyle>
-          <a:p>
-            <a:pPr lvl="0" eaLnBrk="1" latinLnBrk="0" hangingPunct="1"/>
-            <a:r>
-              <a:rPr kumimoji="0" lang="ru-RU" smtClean="0"/>
-              <a:t>Образец текста</a:t>
-            </a:r>
-          </a:p>
-        </p:txBody>
-      </p:sp>
-      <p:sp>
-        <p:nvSpPr>
-          <p:cNvPr id="5" name="Дата 4"/>
-          <p:cNvSpPr>
-            <a:spLocks noGrp="1"/>
-          </p:cNvSpPr>
-          <p:nvPr>
-            <p:ph type="dt" sz="half" idx="10"/>
-          </p:nvPr>
-        </p:nvSpPr>
-        <p:spPr>
-          <a:xfrm>
-            <a:off x="164592" y="1170432"/>
-            <a:ext cx="2523744" cy="201168"/>
-          </a:xfrm>
-        </p:spPr>
-        <p:txBody>
-          <a:bodyPr/>
-          <a:lstStyle/>
-          <a:p>
-            <a:fld id="{5B106E36-FD25-4E2D-B0AA-010F637433A0}" type="datetimeFigureOut">
-              <a:rPr lang="ru-RU" smtClean="0"/>
-              <a:pPr/>
-              <a:t>28.02.2023</a:t>
-            </a:fld>
-            <a:endParaRPr lang="ru-RU"/>
-          </a:p>
-        </p:txBody>
-      </p:sp>
-      <p:sp>
-        <p:nvSpPr>
-          <p:cNvPr id="11" name="Прямоугольник 10"/>
+          <p:cNvPr id="9" name="Прямоугольник с одним вырезанным скругленным углом 8"/>
           <p:cNvSpPr/>
           <p:nvPr/>
         </p:nvSpPr>
         <p:spPr>
-          <a:xfrm>
-            <a:off x="2855737" y="0"/>
-            <a:ext cx="45720" cy="6858000"/>
+          <a:xfrm rot="420000" flipV="1">
+            <a:off x="3165753" y="1108077"/>
+            <a:ext cx="5257800" cy="4114800"/>
           </a:xfrm>
-          <a:prstGeom prst="rect">
-            <a:avLst/>
+          <a:prstGeom prst="snipRoundRect">
+            <a:avLst>
+              <a:gd name="adj1" fmla="val 0"/>
+              <a:gd name="adj2" fmla="val 3646"/>
+            </a:avLst>
           </a:prstGeom>
           <a:solidFill>
             <a:srgbClr val="FFFFFF"/>
           </a:solidFill>
-          <a:ln w="48000" cap="flat" cmpd="thickThin" algn="ctr">
-            <a:noFill/>
-            <a:prstDash val="solid"/>
-          </a:ln>
-        </p:spPr>
-        <p:style>
-          <a:lnRef idx="2">
-            <a:schemeClr val="accent1"/>
-          </a:lnRef>
-          <a:fillRef idx="1">
-            <a:schemeClr val="accent1"/>
-          </a:fillRef>
-          <a:effectRef idx="0">
-            <a:schemeClr val="accent1"/>
-          </a:effectRef>
-          <a:fontRef idx="minor">
-            <a:schemeClr val="lt1"/>
-          </a:fontRef>
-        </p:style>
-        <p:txBody>
-          <a:bodyPr rtlCol="0" anchor="ctr"/>
-          <a:lstStyle>
-            <a:extLst/>
-          </a:lstStyle>
-          <a:p>
-            <a:pPr algn="ctr" eaLnBrk="1" latinLnBrk="0" hangingPunct="1"/>
-            <a:endParaRPr kumimoji="0" lang="en-US"/>
-          </a:p>
-        </p:txBody>
-      </p:sp>
-      <p:sp>
-        <p:nvSpPr>
-          <p:cNvPr id="9" name="Прямоугольник 8"/>
-          <p:cNvSpPr/>
-          <p:nvPr/>
-        </p:nvSpPr>
-        <p:spPr bwMode="invGray">
-          <a:xfrm>
-            <a:off x="2855737" y="0"/>
-            <a:ext cx="45720" cy="6858000"/>
-          </a:xfrm>
-          <a:prstGeom prst="rect">
-            <a:avLst/>
-          </a:prstGeom>
-          <a:solidFill>
-            <a:srgbClr val="FFFFFF"/>
-          </a:solidFill>
-          <a:ln w="48000" cap="flat" cmpd="thickThin" algn="ctr">
-            <a:noFill/>
-            <a:prstDash val="solid"/>
-          </a:ln>
-        </p:spPr>
-        <p:style>
-          <a:lnRef idx="2">
-            <a:schemeClr val="accent1"/>
-          </a:lnRef>
-          <a:fillRef idx="1">
-            <a:schemeClr val="accent1"/>
-          </a:fillRef>
-          <a:effectRef idx="0">
-            <a:schemeClr val="accent1"/>
-          </a:effectRef>
-          <a:fontRef idx="minor">
-            <a:schemeClr val="lt1"/>
-          </a:fontRef>
-        </p:style>
-        <p:txBody>
-          <a:bodyPr rtlCol="0" anchor="ctr"/>
-          <a:lstStyle>
-            <a:extLst/>
-          </a:lstStyle>
-          <a:p>
-            <a:pPr algn="ctr" eaLnBrk="1" latinLnBrk="0" hangingPunct="1"/>
-            <a:endParaRPr kumimoji="0" lang="en-US"/>
-          </a:p>
-        </p:txBody>
-      </p:sp>
-      <p:sp>
-        <p:nvSpPr>
-          <p:cNvPr id="6" name="Нижний колонтитул 5"/>
-          <p:cNvSpPr>
-            <a:spLocks noGrp="1"/>
-          </p:cNvSpPr>
-          <p:nvPr>
-            <p:ph type="ftr" sz="quarter" idx="11"/>
-          </p:nvPr>
-        </p:nvSpPr>
-        <p:spPr>
-          <a:xfrm>
-            <a:off x="3035808" y="1170432"/>
-            <a:ext cx="5193792" cy="201168"/>
-          </a:xfrm>
-        </p:spPr>
-        <p:txBody>
-          <a:bodyPr/>
-          <a:lstStyle>
-            <a:lvl1pPr>
-              <a:defRPr>
-                <a:solidFill>
-                  <a:schemeClr val="bg1">
-                    <a:shade val="50000"/>
-                  </a:schemeClr>
-                </a:solidFill>
-              </a:defRPr>
-            </a:lvl1pPr>
-          </a:lstStyle>
-          <a:p>
-            <a:endParaRPr lang="ru-RU"/>
-          </a:p>
-        </p:txBody>
-      </p:sp>
-      <p:sp>
-        <p:nvSpPr>
-          <p:cNvPr id="7" name="Номер слайда 6"/>
-          <p:cNvSpPr>
-            <a:spLocks noGrp="1"/>
-          </p:cNvSpPr>
-          <p:nvPr>
-            <p:ph type="sldNum" sz="quarter" idx="12"/>
-          </p:nvPr>
-        </p:nvSpPr>
-        <p:spPr>
-          <a:xfrm>
-            <a:off x="8339328" y="1170432"/>
-            <a:ext cx="733864" cy="201168"/>
-          </a:xfrm>
-        </p:spPr>
-        <p:txBody>
-          <a:bodyPr/>
-          <a:lstStyle/>
-          <a:p>
-            <a:fld id="{725C68B6-61C2-468F-89AB-4B9F7531AA68}" type="slidenum">
-              <a:rPr lang="ru-RU" smtClean="0"/>
-              <a:pPr/>
-              <a:t>‹#›</a:t>
-            </a:fld>
-            <a:endParaRPr lang="ru-RU"/>
-          </a:p>
-        </p:txBody>
-      </p:sp>
-    </p:spTree>
-  </p:cSld>
-  <p:clrMapOvr>
-    <a:overrideClrMapping bg1="lt1" tx1="dk1" bg2="lt2" tx2="dk2" accent1="accent1" accent2="accent2" accent3="accent3" accent4="accent4" accent5="accent5" accent6="accent6" hlink="hlink" folHlink="folHlink"/>
-  </p:clrMapOvr>
-</p:sldLayout>
-</file>
-
-<file path=ppt/slideMasters/slideMaster1.xml><?xml version="1.0" encoding="utf-8"?>
-<p:sldMaster xmlns:a="http://schemas.openxmlformats.org/drawingml/2006/main" xmlns:r="http://schemas.openxmlformats.org/officeDocument/2006/relationships" xmlns:p="http://schemas.openxmlformats.org/presentationml/2006/main">
-  <p:cSld>
-    <p:bg>
-      <p:bgRef idx="1001">
-        <a:schemeClr val="bg1"/>
-      </p:bgRef>
-    </p:bg>
-    <p:spTree>
-      <p:nvGrpSpPr>
-        <p:cNvPr id="1" name=""/>
-        <p:cNvGrpSpPr/>
-        <p:nvPr/>
-      </p:nvGrpSpPr>
-      <p:grpSpPr>
-        <a:xfrm>
-          <a:off x="0" y="0"/>
-          <a:ext cx="0" cy="0"/>
-          <a:chOff x="0" y="0"/>
-          <a:chExt cx="0" cy="0"/>
-        </a:xfrm>
-      </p:grpSpPr>
-      <p:sp>
-        <p:nvSpPr>
-          <p:cNvPr id="10" name="Прямоугольник 9"/>
-          <p:cNvSpPr/>
-          <p:nvPr/>
-        </p:nvSpPr>
-        <p:spPr bwMode="invGray">
-          <a:xfrm>
-            <a:off x="0" y="1435895"/>
-            <a:ext cx="9144000" cy="45720"/>
-          </a:xfrm>
-          <a:prstGeom prst="rect">
-            <a:avLst/>
-          </a:prstGeom>
-          <a:solidFill>
-            <a:srgbClr val="FFFFFF"/>
-          </a:solidFill>
-          <a:ln w="48000" cap="flat" cmpd="thickThin" algn="ctr">
-            <a:noFill/>
+          <a:ln w="3175" cap="rnd" cmpd="sng" algn="ctr">
+            <a:solidFill>
+              <a:srgbClr val="C0C0C0"/>
+            </a:solidFill>
             <a:prstDash val="solid"/>
           </a:ln>
           <a:effectLst>
-            <a:outerShdw blurRad="31750" dist="10160" dir="5400000" algn="tl" rotWithShape="0">
+            <a:outerShdw blurRad="63500" dist="38500" dir="7500000" sx="98500" sy="100080" kx="100000" algn="tl" rotWithShape="0">
               <a:srgbClr val="000000">
-                <a:alpha val="60000"/>
+                <a:alpha val="25000"/>
               </a:srgbClr>
             </a:outerShdw>
           </a:effectLst>
@@ -3212,9 +2313,7 @@
         </p:style>
         <p:txBody>
           <a:bodyPr rtlCol="0" anchor="ctr"/>
-          <a:lstStyle>
-            <a:extLst/>
-          </a:lstStyle>
+          <a:lstStyle/>
           <a:p>
             <a:pPr algn="ctr" eaLnBrk="1" latinLnBrk="0" hangingPunct="1"/>
             <a:endParaRPr kumimoji="0" lang="en-US"/>
@@ -3223,25 +2322,35 @@
       </p:sp>
       <p:sp>
         <p:nvSpPr>
-          <p:cNvPr id="7" name="Прямоугольник 6"/>
+          <p:cNvPr id="12" name="Прямоугольный треугольник 11"/>
           <p:cNvSpPr/>
           <p:nvPr/>
         </p:nvSpPr>
-        <p:spPr bwMode="ltGray">
-          <a:xfrm>
-            <a:off x="0" y="0"/>
-            <a:ext cx="9143999" cy="1433733"/>
+        <p:spPr>
+          <a:xfrm rot="420000" flipV="1">
+            <a:off x="8004134" y="5359769"/>
+            <a:ext cx="155448" cy="155448"/>
           </a:xfrm>
-          <a:prstGeom prst="rect">
+          <a:prstGeom prst="rtTriangle">
             <a:avLst/>
           </a:prstGeom>
           <a:solidFill>
-            <a:srgbClr val="000000"/>
+            <a:srgbClr val="FFFFFF"/>
           </a:solidFill>
-          <a:ln w="48000" cap="flat" cmpd="thickThin" algn="ctr">
-            <a:noFill/>
+          <a:ln w="12700" cap="flat" cmpd="sng" algn="ctr">
+            <a:solidFill>
+              <a:srgbClr val="FFFFFF"/>
+            </a:solidFill>
             <a:prstDash val="solid"/>
+            <a:bevel/>
           </a:ln>
+          <a:effectLst>
+            <a:outerShdw blurRad="19685" dist="6350" dir="12900000" algn="tl" rotWithShape="0">
+              <a:srgbClr val="000000">
+                <a:alpha val="47000"/>
+              </a:srgbClr>
+            </a:outerShdw>
+          </a:effectLst>
         </p:spPr>
         <p:style>
           <a:lnRef idx="2">
@@ -3259,9 +2368,7 @@
         </p:style>
         <p:txBody>
           <a:bodyPr rtlCol="0" anchor="ctr"/>
-          <a:lstStyle>
-            <a:extLst/>
-          </a:lstStyle>
+          <a:lstStyle/>
           <a:p>
             <a:pPr algn="ctr" eaLnBrk="1" latinLnBrk="0" hangingPunct="1"/>
             <a:endParaRPr kumimoji="0" lang="en-US"/>
@@ -3280,29 +2387,764 @@
         </p:nvSpPr>
         <p:spPr>
           <a:xfrm>
-            <a:off x="457200" y="152400"/>
-            <a:ext cx="8229600" cy="1251062"/>
+            <a:off x="609600" y="1176996"/>
+            <a:ext cx="2212848" cy="1582621"/>
+          </a:xfrm>
+        </p:spPr>
+        <p:txBody>
+          <a:bodyPr vert="horz" lIns="45720" tIns="45720" rIns="45720" bIns="45720" anchor="b"/>
+          <a:lstStyle>
+            <a:lvl1pPr algn="l">
+              <a:buNone/>
+              <a:defRPr sz="2000" b="1">
+                <a:solidFill>
+                  <a:schemeClr val="tx2"/>
+                </a:solidFill>
+              </a:defRPr>
+            </a:lvl1pPr>
+          </a:lstStyle>
+          <a:p>
+            <a:r>
+              <a:rPr kumimoji="0" lang="ru-RU" smtClean="0"/>
+              <a:t>Образец заголовка</a:t>
+            </a:r>
+            <a:endParaRPr kumimoji="0" lang="en-US"/>
+          </a:p>
+        </p:txBody>
+      </p:sp>
+      <p:sp>
+        <p:nvSpPr>
+          <p:cNvPr id="4" name="Текст 3"/>
+          <p:cNvSpPr>
+            <a:spLocks noGrp="1"/>
+          </p:cNvSpPr>
+          <p:nvPr>
+            <p:ph type="body" sz="half" idx="2"/>
+          </p:nvPr>
+        </p:nvSpPr>
+        <p:spPr>
+          <a:xfrm>
+            <a:off x="609600" y="2828785"/>
+            <a:ext cx="2209800" cy="2179320"/>
+          </a:xfrm>
+        </p:spPr>
+        <p:txBody>
+          <a:bodyPr lIns="64008" rIns="45720" bIns="45720" anchor="t"/>
+          <a:lstStyle>
+            <a:lvl1pPr marL="0" indent="0" algn="l">
+              <a:spcBef>
+                <a:spcPts val="250"/>
+              </a:spcBef>
+              <a:buFontTx/>
+              <a:buNone/>
+              <a:defRPr sz="1300"/>
+            </a:lvl1pPr>
+            <a:lvl2pPr>
+              <a:defRPr sz="1200"/>
+            </a:lvl2pPr>
+            <a:lvl3pPr>
+              <a:defRPr sz="1000"/>
+            </a:lvl3pPr>
+            <a:lvl4pPr>
+              <a:defRPr sz="900"/>
+            </a:lvl4pPr>
+            <a:lvl5pPr>
+              <a:defRPr sz="900"/>
+            </a:lvl5pPr>
+          </a:lstStyle>
+          <a:p>
+            <a:pPr lvl="0" eaLnBrk="1" latinLnBrk="0" hangingPunct="1"/>
+            <a:r>
+              <a:rPr kumimoji="0" lang="ru-RU" smtClean="0"/>
+              <a:t>Образец текста</a:t>
+            </a:r>
+          </a:p>
+        </p:txBody>
+      </p:sp>
+      <p:sp>
+        <p:nvSpPr>
+          <p:cNvPr id="5" name="Дата 4"/>
+          <p:cNvSpPr>
+            <a:spLocks noGrp="1"/>
+          </p:cNvSpPr>
+          <p:nvPr>
+            <p:ph type="dt" sz="half" idx="10"/>
+          </p:nvPr>
+        </p:nvSpPr>
+        <p:spPr/>
+        <p:txBody>
+          <a:bodyPr/>
+          <a:lstStyle/>
+          <a:p>
+            <a:fld id="{5B106E36-FD25-4E2D-B0AA-010F637433A0}" type="datetimeFigureOut">
+              <a:rPr lang="ru-RU" smtClean="0"/>
+              <a:pPr/>
+              <a:t>28.02.2023</a:t>
+            </a:fld>
+            <a:endParaRPr lang="ru-RU"/>
+          </a:p>
+        </p:txBody>
+      </p:sp>
+      <p:sp>
+        <p:nvSpPr>
+          <p:cNvPr id="6" name="Нижний колонтитул 5"/>
+          <p:cNvSpPr>
+            <a:spLocks noGrp="1"/>
+          </p:cNvSpPr>
+          <p:nvPr>
+            <p:ph type="ftr" sz="quarter" idx="11"/>
+          </p:nvPr>
+        </p:nvSpPr>
+        <p:spPr/>
+        <p:txBody>
+          <a:bodyPr/>
+          <a:lstStyle/>
+          <a:p>
+            <a:endParaRPr lang="ru-RU"/>
+          </a:p>
+        </p:txBody>
+      </p:sp>
+      <p:sp>
+        <p:nvSpPr>
+          <p:cNvPr id="7" name="Номер слайда 6"/>
+          <p:cNvSpPr>
+            <a:spLocks noGrp="1"/>
+          </p:cNvSpPr>
+          <p:nvPr>
+            <p:ph type="sldNum" sz="quarter" idx="12"/>
+          </p:nvPr>
+        </p:nvSpPr>
+        <p:spPr>
+          <a:xfrm>
+            <a:off x="8077200" y="6356350"/>
+            <a:ext cx="609600" cy="365125"/>
+          </a:xfrm>
+        </p:spPr>
+        <p:txBody>
+          <a:bodyPr/>
+          <a:lstStyle/>
+          <a:p>
+            <a:fld id="{725C68B6-61C2-468F-89AB-4B9F7531AA68}" type="slidenum">
+              <a:rPr lang="ru-RU" smtClean="0"/>
+              <a:pPr/>
+              <a:t>‹#›</a:t>
+            </a:fld>
+            <a:endParaRPr lang="ru-RU"/>
+          </a:p>
+        </p:txBody>
+      </p:sp>
+      <p:sp>
+        <p:nvSpPr>
+          <p:cNvPr id="3" name="Рисунок 2"/>
+          <p:cNvSpPr>
+            <a:spLocks noGrp="1"/>
+          </p:cNvSpPr>
+          <p:nvPr>
+            <p:ph type="pic" idx="1"/>
+          </p:nvPr>
+        </p:nvSpPr>
+        <p:spPr>
+          <a:xfrm rot="420000">
+            <a:off x="3485793" y="1199517"/>
+            <a:ext cx="4617720" cy="3931920"/>
+          </a:xfrm>
+          <a:prstGeom prst="rect">
+            <a:avLst/>
+          </a:prstGeom>
+          <a:solidFill>
+            <a:schemeClr val="bg2"/>
+          </a:solidFill>
+          <a:ln w="3000" cap="rnd">
+            <a:solidFill>
+              <a:srgbClr val="C0C0C0"/>
+            </a:solidFill>
+            <a:round/>
+          </a:ln>
+          <a:effectLst/>
+        </p:spPr>
+        <p:txBody>
+          <a:bodyPr/>
+          <a:lstStyle>
+            <a:lvl1pPr marL="0" indent="0">
+              <a:buNone/>
+              <a:defRPr sz="3200"/>
+            </a:lvl1pPr>
+          </a:lstStyle>
+          <a:p>
+            <a:r>
+              <a:rPr kumimoji="0" lang="ru-RU" smtClean="0"/>
+              <a:t>Вставка рисунка</a:t>
+            </a:r>
+            <a:endParaRPr kumimoji="0" lang="en-US" dirty="0"/>
+          </a:p>
+        </p:txBody>
+      </p:sp>
+      <p:sp>
+        <p:nvSpPr>
+          <p:cNvPr id="10" name="Полилиния 9"/>
+          <p:cNvSpPr>
+            <a:spLocks/>
+          </p:cNvSpPr>
+          <p:nvPr/>
+        </p:nvSpPr>
+        <p:spPr bwMode="auto">
+          <a:xfrm flipV="1">
+            <a:off x="-9525" y="5816600"/>
+            <a:ext cx="9163050" cy="1041400"/>
+          </a:xfrm>
+          <a:custGeom>
+            <a:avLst>
+              <a:gd name="A1" fmla="val 0"/>
+              <a:gd name="A2" fmla="val 0"/>
+              <a:gd name="A3" fmla="val 0"/>
+              <a:gd name="A4" fmla="val 0"/>
+              <a:gd name="A5" fmla="val 0"/>
+              <a:gd name="A6" fmla="val 0"/>
+              <a:gd name="A7" fmla="val 0"/>
+              <a:gd name="A8" fmla="val 0"/>
+            </a:avLst>
+            <a:gdLst/>
+            <a:ahLst/>
+            <a:cxnLst>
+              <a:cxn ang="0">
+                <a:pos x="6" y="2"/>
+              </a:cxn>
+              <a:cxn ang="0">
+                <a:pos x="2542" y="0"/>
+              </a:cxn>
+              <a:cxn ang="0">
+                <a:pos x="4374" y="367"/>
+              </a:cxn>
+              <a:cxn ang="0">
+                <a:pos x="5766" y="55"/>
+              </a:cxn>
+              <a:cxn ang="0">
+                <a:pos x="5772" y="213"/>
+              </a:cxn>
+              <a:cxn ang="0">
+                <a:pos x="4302" y="439"/>
+              </a:cxn>
+              <a:cxn ang="0">
+                <a:pos x="1488" y="201"/>
+              </a:cxn>
+              <a:cxn ang="0">
+                <a:pos x="0" y="656"/>
+              </a:cxn>
+              <a:cxn ang="0">
+                <a:pos x="6" y="2"/>
+              </a:cxn>
+            </a:cxnLst>
+            <a:rect l="0" t="0" r="0" b="0"/>
+            <a:pathLst>
+              <a:path w="5772" h="656">
+                <a:moveTo>
+                  <a:pt x="6" y="2"/>
+                </a:moveTo>
+                <a:lnTo>
+                  <a:pt x="2542" y="0"/>
+                </a:lnTo>
+                <a:cubicBezTo>
+                  <a:pt x="2746" y="101"/>
+                  <a:pt x="3828" y="367"/>
+                  <a:pt x="4374" y="367"/>
+                </a:cubicBezTo>
+                <a:cubicBezTo>
+                  <a:pt x="4920" y="367"/>
+                  <a:pt x="5526" y="152"/>
+                  <a:pt x="5766" y="55"/>
+                </a:cubicBezTo>
+                <a:lnTo>
+                  <a:pt x="5772" y="213"/>
+                </a:lnTo>
+                <a:cubicBezTo>
+                  <a:pt x="5670" y="257"/>
+                  <a:pt x="5016" y="441"/>
+                  <a:pt x="4302" y="439"/>
+                </a:cubicBezTo>
+                <a:cubicBezTo>
+                  <a:pt x="3588" y="437"/>
+                  <a:pt x="2205" y="165"/>
+                  <a:pt x="1488" y="201"/>
+                </a:cubicBezTo>
+                <a:cubicBezTo>
+                  <a:pt x="750" y="209"/>
+                  <a:pt x="270" y="482"/>
+                  <a:pt x="0" y="656"/>
+                </a:cubicBezTo>
+                <a:lnTo>
+                  <a:pt x="6" y="2"/>
+                </a:lnTo>
+                <a:close/>
+              </a:path>
+            </a:pathLst>
+          </a:custGeom>
+          <a:gradFill>
+            <a:gsLst>
+              <a:gs pos="0">
+                <a:schemeClr val="accent2">
+                  <a:shade val="50000"/>
+                  <a:alpha val="45000"/>
+                  <a:satMod val="120000"/>
+                </a:schemeClr>
+              </a:gs>
+              <a:gs pos="100000">
+                <a:schemeClr val="accent3">
+                  <a:shade val="80000"/>
+                  <a:alpha val="55000"/>
+                  <a:satMod val="155000"/>
+                </a:schemeClr>
+              </a:gs>
+            </a:gsLst>
+            <a:lin ang="5400000" scaled="1"/>
+          </a:gradFill>
+          <a:ln w="9525" cap="flat" cmpd="sng" algn="ctr">
+            <a:noFill/>
+            <a:prstDash val="solid"/>
+            <a:round/>
+            <a:headEnd type="none" w="med" len="med"/>
+            <a:tailEnd type="none" w="med" len="med"/>
+          </a:ln>
+          <a:effectLst/>
+        </p:spPr>
+        <p:txBody>
+          <a:bodyPr vert="horz" wrap="square" lIns="91440" tIns="45720" rIns="91440" bIns="45720" anchor="t" compatLnSpc="1"/>
+          <a:lstStyle/>
+          <a:p>
+            <a:pPr marL="0" algn="l" rtl="0" eaLnBrk="1" latinLnBrk="0" hangingPunct="1"/>
+            <a:endParaRPr kumimoji="0" lang="en-US">
+              <a:solidFill>
+                <a:schemeClr val="tx1"/>
+              </a:solidFill>
+              <a:latin typeface="+mn-lt"/>
+              <a:ea typeface="+mn-ea"/>
+              <a:cs typeface="+mn-cs"/>
+            </a:endParaRPr>
+          </a:p>
+        </p:txBody>
+      </p:sp>
+      <p:sp>
+        <p:nvSpPr>
+          <p:cNvPr id="11" name="Полилиния 10"/>
+          <p:cNvSpPr>
+            <a:spLocks/>
+          </p:cNvSpPr>
+          <p:nvPr/>
+        </p:nvSpPr>
+        <p:spPr bwMode="auto">
+          <a:xfrm flipV="1">
+            <a:off x="4381500" y="6219825"/>
+            <a:ext cx="4762500" cy="638175"/>
+          </a:xfrm>
+          <a:custGeom>
+            <a:avLst>
+              <a:gd name="A1" fmla="val 0"/>
+              <a:gd name="A2" fmla="val 0"/>
+              <a:gd name="A3" fmla="val 0"/>
+              <a:gd name="A4" fmla="val 0"/>
+              <a:gd name="A5" fmla="val 0"/>
+              <a:gd name="A6" fmla="val 0"/>
+              <a:gd name="A7" fmla="val 0"/>
+              <a:gd name="A8" fmla="val 0"/>
+            </a:avLst>
+            <a:gdLst/>
+            <a:ahLst/>
+            <a:cxnLst>
+              <a:cxn ang="0">
+                <a:pos x="0" y="0"/>
+              </a:cxn>
+              <a:cxn ang="0">
+                <a:pos x="1668" y="564"/>
+              </a:cxn>
+              <a:cxn ang="0">
+                <a:pos x="3000" y="186"/>
+              </a:cxn>
+              <a:cxn ang="0">
+                <a:pos x="3000" y="6"/>
+              </a:cxn>
+              <a:cxn ang="0">
+                <a:pos x="0" y="0"/>
+              </a:cxn>
+            </a:cxnLst>
+            <a:rect l="0" t="0" r="0" b="0"/>
+            <a:pathLst>
+              <a:path w="3000" h="595">
+                <a:moveTo>
+                  <a:pt x="0" y="0"/>
+                </a:moveTo>
+                <a:cubicBezTo>
+                  <a:pt x="174" y="102"/>
+                  <a:pt x="1168" y="533"/>
+                  <a:pt x="1668" y="564"/>
+                </a:cubicBezTo>
+                <a:cubicBezTo>
+                  <a:pt x="2168" y="595"/>
+                  <a:pt x="2778" y="279"/>
+                  <a:pt x="3000" y="186"/>
+                </a:cubicBezTo>
+                <a:lnTo>
+                  <a:pt x="3000" y="6"/>
+                </a:lnTo>
+                <a:lnTo>
+                  <a:pt x="0" y="0"/>
+                </a:lnTo>
+                <a:close/>
+              </a:path>
+            </a:pathLst>
+          </a:custGeom>
+          <a:gradFill>
+            <a:gsLst>
+              <a:gs pos="0">
+                <a:schemeClr val="accent3">
+                  <a:shade val="50000"/>
+                  <a:alpha val="30000"/>
+                  <a:satMod val="130000"/>
+                </a:schemeClr>
+              </a:gs>
+              <a:gs pos="80000">
+                <a:schemeClr val="accent2">
+                  <a:shade val="75000"/>
+                  <a:alpha val="45000"/>
+                  <a:satMod val="140000"/>
+                </a:schemeClr>
+              </a:gs>
+            </a:gsLst>
+            <a:lin ang="5400000" scaled="1"/>
+          </a:gradFill>
+          <a:ln w="9525" cap="flat" cmpd="sng" algn="ctr">
+            <a:noFill/>
+            <a:prstDash val="solid"/>
+            <a:round/>
+            <a:headEnd type="none" w="med" len="med"/>
+            <a:tailEnd type="none" w="med" len="med"/>
+          </a:ln>
+          <a:effectLst/>
+        </p:spPr>
+        <p:txBody>
+          <a:bodyPr vert="horz" wrap="square" lIns="91440" tIns="45720" rIns="91440" bIns="45720" anchor="t" compatLnSpc="1"/>
+          <a:lstStyle/>
+          <a:p>
+            <a:pPr marL="0" algn="l" rtl="0" eaLnBrk="1" latinLnBrk="0" hangingPunct="1"/>
+            <a:endParaRPr kumimoji="0" lang="en-US">
+              <a:solidFill>
+                <a:schemeClr val="tx1"/>
+              </a:solidFill>
+              <a:latin typeface="+mn-lt"/>
+              <a:ea typeface="+mn-ea"/>
+              <a:cs typeface="+mn-cs"/>
+            </a:endParaRPr>
+          </a:p>
+        </p:txBody>
+      </p:sp>
+    </p:spTree>
+  </p:cSld>
+  <p:clrMapOvr>
+    <a:masterClrMapping/>
+  </p:clrMapOvr>
+</p:sldLayout>
+</file>
+
+<file path=ppt/slideMasters/slideMaster1.xml><?xml version="1.0" encoding="utf-8"?>
+<p:sldMaster xmlns:a="http://schemas.openxmlformats.org/drawingml/2006/main" xmlns:r="http://schemas.openxmlformats.org/officeDocument/2006/relationships" xmlns:p="http://schemas.openxmlformats.org/presentationml/2006/main">
+  <p:cSld>
+    <p:bg>
+      <p:bgRef idx="1003">
+        <a:schemeClr val="bg1"/>
+      </p:bgRef>
+    </p:bg>
+    <p:spTree>
+      <p:nvGrpSpPr>
+        <p:cNvPr id="1" name=""/>
+        <p:cNvGrpSpPr/>
+        <p:nvPr/>
+      </p:nvGrpSpPr>
+      <p:grpSpPr>
+        <a:xfrm>
+          <a:off x="0" y="0"/>
+          <a:ext cx="0" cy="0"/>
+          <a:chOff x="0" y="0"/>
+          <a:chExt cx="0" cy="0"/>
+        </a:xfrm>
+      </p:grpSpPr>
+      <p:sp>
+        <p:nvSpPr>
+          <p:cNvPr id="7" name="Полилиния 6"/>
+          <p:cNvSpPr>
+            <a:spLocks/>
+          </p:cNvSpPr>
+          <p:nvPr/>
+        </p:nvSpPr>
+        <p:spPr bwMode="auto">
+          <a:xfrm>
+            <a:off x="-9525" y="-7144"/>
+            <a:ext cx="9163050" cy="1041400"/>
+          </a:xfrm>
+          <a:custGeom>
+            <a:avLst>
+              <a:gd name="A1" fmla="val 0"/>
+              <a:gd name="A2" fmla="val 0"/>
+              <a:gd name="A3" fmla="val 0"/>
+              <a:gd name="A4" fmla="val 0"/>
+              <a:gd name="A5" fmla="val 0"/>
+              <a:gd name="A6" fmla="val 0"/>
+              <a:gd name="A7" fmla="val 0"/>
+              <a:gd name="A8" fmla="val 0"/>
+            </a:avLst>
+            <a:gdLst/>
+            <a:ahLst/>
+            <a:cxnLst>
+              <a:cxn ang="0">
+                <a:pos x="6" y="2"/>
+              </a:cxn>
+              <a:cxn ang="0">
+                <a:pos x="2542" y="0"/>
+              </a:cxn>
+              <a:cxn ang="0">
+                <a:pos x="4374" y="367"/>
+              </a:cxn>
+              <a:cxn ang="0">
+                <a:pos x="5766" y="55"/>
+              </a:cxn>
+              <a:cxn ang="0">
+                <a:pos x="5772" y="213"/>
+              </a:cxn>
+              <a:cxn ang="0">
+                <a:pos x="4302" y="439"/>
+              </a:cxn>
+              <a:cxn ang="0">
+                <a:pos x="1488" y="201"/>
+              </a:cxn>
+              <a:cxn ang="0">
+                <a:pos x="0" y="656"/>
+              </a:cxn>
+              <a:cxn ang="0">
+                <a:pos x="6" y="2"/>
+              </a:cxn>
+            </a:cxnLst>
+            <a:rect l="0" t="0" r="0" b="0"/>
+            <a:pathLst>
+              <a:path w="5772" h="656">
+                <a:moveTo>
+                  <a:pt x="6" y="2"/>
+                </a:moveTo>
+                <a:lnTo>
+                  <a:pt x="2542" y="0"/>
+                </a:lnTo>
+                <a:cubicBezTo>
+                  <a:pt x="2746" y="101"/>
+                  <a:pt x="3828" y="367"/>
+                  <a:pt x="4374" y="367"/>
+                </a:cubicBezTo>
+                <a:cubicBezTo>
+                  <a:pt x="4920" y="367"/>
+                  <a:pt x="5526" y="152"/>
+                  <a:pt x="5766" y="55"/>
+                </a:cubicBezTo>
+                <a:lnTo>
+                  <a:pt x="5772" y="213"/>
+                </a:lnTo>
+                <a:cubicBezTo>
+                  <a:pt x="5670" y="257"/>
+                  <a:pt x="5016" y="441"/>
+                  <a:pt x="4302" y="439"/>
+                </a:cubicBezTo>
+                <a:cubicBezTo>
+                  <a:pt x="3588" y="437"/>
+                  <a:pt x="2205" y="165"/>
+                  <a:pt x="1488" y="201"/>
+                </a:cubicBezTo>
+                <a:cubicBezTo>
+                  <a:pt x="750" y="209"/>
+                  <a:pt x="270" y="482"/>
+                  <a:pt x="0" y="656"/>
+                </a:cubicBezTo>
+                <a:lnTo>
+                  <a:pt x="6" y="2"/>
+                </a:lnTo>
+                <a:close/>
+              </a:path>
+            </a:pathLst>
+          </a:custGeom>
+          <a:gradFill>
+            <a:gsLst>
+              <a:gs pos="0">
+                <a:schemeClr val="accent2">
+                  <a:shade val="50000"/>
+                  <a:alpha val="45000"/>
+                  <a:satMod val="120000"/>
+                </a:schemeClr>
+              </a:gs>
+              <a:gs pos="100000">
+                <a:schemeClr val="accent3">
+                  <a:shade val="80000"/>
+                  <a:alpha val="55000"/>
+                  <a:satMod val="155000"/>
+                </a:schemeClr>
+              </a:gs>
+            </a:gsLst>
+            <a:lin ang="5400000" scaled="1"/>
+          </a:gradFill>
+          <a:ln w="9525" cap="flat" cmpd="sng" algn="ctr">
+            <a:noFill/>
+            <a:prstDash val="solid"/>
+            <a:round/>
+            <a:headEnd type="none" w="med" len="med"/>
+            <a:tailEnd type="none" w="med" len="med"/>
+          </a:ln>
+          <a:effectLst/>
+        </p:spPr>
+        <p:txBody>
+          <a:bodyPr vert="horz" wrap="square" lIns="91440" tIns="45720" rIns="91440" bIns="45720" anchor="t" compatLnSpc="1"/>
+          <a:lstStyle/>
+          <a:p>
+            <a:pPr marL="0" algn="l" rtl="0" eaLnBrk="1" latinLnBrk="0" hangingPunct="1"/>
+            <a:endParaRPr kumimoji="0" lang="en-US">
+              <a:solidFill>
+                <a:schemeClr val="tx1"/>
+              </a:solidFill>
+              <a:latin typeface="+mn-lt"/>
+              <a:ea typeface="+mn-ea"/>
+              <a:cs typeface="+mn-cs"/>
+            </a:endParaRPr>
+          </a:p>
+        </p:txBody>
+      </p:sp>
+      <p:sp>
+        <p:nvSpPr>
+          <p:cNvPr id="8" name="Полилиния 7"/>
+          <p:cNvSpPr>
+            <a:spLocks/>
+          </p:cNvSpPr>
+          <p:nvPr/>
+        </p:nvSpPr>
+        <p:spPr bwMode="auto">
+          <a:xfrm>
+            <a:off x="4381500" y="-7144"/>
+            <a:ext cx="4762500" cy="638175"/>
+          </a:xfrm>
+          <a:custGeom>
+            <a:avLst>
+              <a:gd name="A1" fmla="val 0"/>
+              <a:gd name="A2" fmla="val 0"/>
+              <a:gd name="A3" fmla="val 0"/>
+              <a:gd name="A4" fmla="val 0"/>
+              <a:gd name="A5" fmla="val 0"/>
+              <a:gd name="A6" fmla="val 0"/>
+              <a:gd name="A7" fmla="val 0"/>
+              <a:gd name="A8" fmla="val 0"/>
+            </a:avLst>
+            <a:gdLst/>
+            <a:ahLst/>
+            <a:cxnLst>
+              <a:cxn ang="0">
+                <a:pos x="0" y="0"/>
+              </a:cxn>
+              <a:cxn ang="0">
+                <a:pos x="1668" y="564"/>
+              </a:cxn>
+              <a:cxn ang="0">
+                <a:pos x="3000" y="186"/>
+              </a:cxn>
+              <a:cxn ang="0">
+                <a:pos x="3000" y="6"/>
+              </a:cxn>
+              <a:cxn ang="0">
+                <a:pos x="0" y="0"/>
+              </a:cxn>
+            </a:cxnLst>
+            <a:rect l="0" t="0" r="0" b="0"/>
+            <a:pathLst>
+              <a:path w="3000" h="595">
+                <a:moveTo>
+                  <a:pt x="0" y="0"/>
+                </a:moveTo>
+                <a:cubicBezTo>
+                  <a:pt x="174" y="102"/>
+                  <a:pt x="1168" y="533"/>
+                  <a:pt x="1668" y="564"/>
+                </a:cubicBezTo>
+                <a:cubicBezTo>
+                  <a:pt x="2168" y="595"/>
+                  <a:pt x="2778" y="279"/>
+                  <a:pt x="3000" y="186"/>
+                </a:cubicBezTo>
+                <a:lnTo>
+                  <a:pt x="3000" y="6"/>
+                </a:lnTo>
+                <a:lnTo>
+                  <a:pt x="0" y="0"/>
+                </a:lnTo>
+                <a:close/>
+              </a:path>
+            </a:pathLst>
+          </a:custGeom>
+          <a:gradFill>
+            <a:gsLst>
+              <a:gs pos="0">
+                <a:schemeClr val="accent3">
+                  <a:shade val="50000"/>
+                  <a:alpha val="30000"/>
+                  <a:satMod val="130000"/>
+                </a:schemeClr>
+              </a:gs>
+              <a:gs pos="80000">
+                <a:schemeClr val="accent2">
+                  <a:shade val="75000"/>
+                  <a:alpha val="45000"/>
+                  <a:satMod val="140000"/>
+                </a:schemeClr>
+              </a:gs>
+            </a:gsLst>
+            <a:lin ang="5400000" scaled="1"/>
+          </a:gradFill>
+          <a:ln w="9525" cap="flat" cmpd="sng" algn="ctr">
+            <a:noFill/>
+            <a:prstDash val="solid"/>
+            <a:round/>
+            <a:headEnd type="none" w="med" len="med"/>
+            <a:tailEnd type="none" w="med" len="med"/>
+          </a:ln>
+          <a:effectLst/>
+        </p:spPr>
+        <p:txBody>
+          <a:bodyPr vert="horz" wrap="square" lIns="91440" tIns="45720" rIns="91440" bIns="45720" anchor="t" compatLnSpc="1"/>
+          <a:lstStyle/>
+          <a:p>
+            <a:pPr marL="0" algn="l" rtl="0" eaLnBrk="1" latinLnBrk="0" hangingPunct="1"/>
+            <a:endParaRPr kumimoji="0" lang="en-US">
+              <a:solidFill>
+                <a:schemeClr val="tx1"/>
+              </a:solidFill>
+              <a:latin typeface="+mn-lt"/>
+              <a:ea typeface="+mn-ea"/>
+              <a:cs typeface="+mn-cs"/>
+            </a:endParaRPr>
+          </a:p>
+        </p:txBody>
+      </p:sp>
+      <p:sp>
+        <p:nvSpPr>
+          <p:cNvPr id="9" name="Заголовок 8"/>
+          <p:cNvSpPr>
+            <a:spLocks noGrp="1"/>
+          </p:cNvSpPr>
+          <p:nvPr>
+            <p:ph type="title"/>
+          </p:nvPr>
+        </p:nvSpPr>
+        <p:spPr>
+          <a:xfrm>
+            <a:off x="457200" y="704088"/>
+            <a:ext cx="8229600" cy="1143000"/>
           </a:xfrm>
           <a:prstGeom prst="rect">
             <a:avLst/>
           </a:prstGeom>
         </p:spPr>
         <p:txBody>
-          <a:bodyPr vert="horz" lIns="91440" rIns="45720" rtlCol="0" anchor="ctr">
+          <a:bodyPr vert="horz" lIns="0" rIns="0" bIns="0" anchor="b">
             <a:normAutofit/>
-            <a:scene3d>
-              <a:camera prst="orthographicFront"/>
-              <a:lightRig rig="threePt" dir="t">
-                <a:rot lat="0" lon="0" rev="4800000"/>
-              </a:lightRig>
-            </a:scene3d>
-            <a:sp3d prstMaterial="matte">
-              <a:bevelT w="50800" h="10160"/>
-            </a:sp3d>
           </a:bodyPr>
-          <a:lstStyle>
-            <a:extLst/>
-          </a:lstStyle>
+          <a:lstStyle/>
           <a:p>
             <a:r>
               <a:rPr kumimoji="0" lang="ru-RU" smtClean="0"/>
@@ -3314,7 +3156,7 @@
       </p:sp>
       <p:sp>
         <p:nvSpPr>
-          <p:cNvPr id="3" name="Текст 2"/>
+          <p:cNvPr id="30" name="Текст 29"/>
           <p:cNvSpPr>
             <a:spLocks noGrp="1"/>
           </p:cNvSpPr>
@@ -3324,20 +3166,18 @@
         </p:nvSpPr>
         <p:spPr>
           <a:xfrm>
-            <a:off x="457200" y="1775191"/>
-            <a:ext cx="8229600" cy="4625609"/>
+            <a:off x="457200" y="1935480"/>
+            <a:ext cx="8229600" cy="4389120"/>
           </a:xfrm>
           <a:prstGeom prst="rect">
             <a:avLst/>
           </a:prstGeom>
         </p:spPr>
         <p:txBody>
-          <a:bodyPr vert="horz" lIns="54864" tIns="91440" rtlCol="0">
+          <a:bodyPr vert="horz">
             <a:normAutofit/>
           </a:bodyPr>
-          <a:lstStyle>
-            <a:extLst/>
-          </a:lstStyle>
+          <a:lstStyle/>
           <a:p>
             <a:pPr lvl="0" eaLnBrk="1" latinLnBrk="0" hangingPunct="1"/>
             <a:r>
@@ -3378,7 +3218,7 @@
       </p:sp>
       <p:sp>
         <p:nvSpPr>
-          <p:cNvPr id="4" name="Дата 3"/>
+          <p:cNvPr id="10" name="Дата 9"/>
           <p:cNvSpPr>
             <a:spLocks noGrp="1"/>
           </p:cNvSpPr>
@@ -3388,26 +3228,25 @@
         </p:nvSpPr>
         <p:spPr>
           <a:xfrm>
-            <a:off x="457200" y="6476999"/>
-            <a:ext cx="2133600" cy="274320"/>
+            <a:off x="457200" y="6356350"/>
+            <a:ext cx="2133600" cy="365125"/>
           </a:xfrm>
           <a:prstGeom prst="rect">
             <a:avLst/>
           </a:prstGeom>
         </p:spPr>
         <p:txBody>
-          <a:bodyPr vert="horz" lIns="109728" rIns="45720" bIns="0" rtlCol="0" anchor="b"/>
+          <a:bodyPr vert="horz" lIns="0" tIns="0" rIns="0" bIns="0" anchor="b"/>
           <a:lstStyle>
             <a:lvl1pPr algn="l" eaLnBrk="1" latinLnBrk="0" hangingPunct="1">
               <a:defRPr kumimoji="0" sz="1200">
                 <a:solidFill>
-                  <a:schemeClr val="tx1">
-                    <a:tint val="95000"/>
+                  <a:schemeClr val="tx2">
+                    <a:shade val="90000"/>
                   </a:schemeClr>
                 </a:solidFill>
               </a:defRPr>
             </a:lvl1pPr>
-            <a:extLst/>
           </a:lstStyle>
           <a:p>
             <a:fld id="{5B106E36-FD25-4E2D-B0AA-010F637433A0}" type="datetimeFigureOut">
@@ -3421,7 +3260,7 @@
       </p:sp>
       <p:sp>
         <p:nvSpPr>
-          <p:cNvPr id="5" name="Нижний колонтитул 4"/>
+          <p:cNvPr id="22" name="Нижний колонтитул 21"/>
           <p:cNvSpPr>
             <a:spLocks noGrp="1"/>
           </p:cNvSpPr>
@@ -3431,26 +3270,25 @@
         </p:nvSpPr>
         <p:spPr>
           <a:xfrm>
-            <a:off x="2640596" y="6476999"/>
-            <a:ext cx="5507719" cy="274320"/>
+            <a:off x="2667000" y="6356350"/>
+            <a:ext cx="3352800" cy="365125"/>
           </a:xfrm>
           <a:prstGeom prst="rect">
             <a:avLst/>
           </a:prstGeom>
         </p:spPr>
         <p:txBody>
-          <a:bodyPr vert="horz" lIns="45720" rIns="45720" bIns="0" rtlCol="0" anchor="b"/>
+          <a:bodyPr vert="horz" lIns="0" tIns="0" rIns="0" bIns="0" anchor="b"/>
           <a:lstStyle>
             <a:lvl1pPr algn="l" eaLnBrk="1" latinLnBrk="0" hangingPunct="1">
               <a:defRPr kumimoji="0" sz="1200">
                 <a:solidFill>
-                  <a:schemeClr val="tx1">
-                    <a:tint val="95000"/>
+                  <a:schemeClr val="tx2">
+                    <a:shade val="90000"/>
                   </a:schemeClr>
                 </a:solidFill>
               </a:defRPr>
             </a:lvl1pPr>
-            <a:extLst/>
           </a:lstStyle>
           <a:p>
             <a:endParaRPr lang="ru-RU"/>
@@ -3459,7 +3297,7 @@
       </p:sp>
       <p:sp>
         <p:nvSpPr>
-          <p:cNvPr id="6" name="Номер слайда 5"/>
+          <p:cNvPr id="18" name="Номер слайда 17"/>
           <p:cNvSpPr>
             <a:spLocks noGrp="1"/>
           </p:cNvSpPr>
@@ -3469,26 +3307,25 @@
         </p:nvSpPr>
         <p:spPr>
           <a:xfrm>
-            <a:off x="8204396" y="6476999"/>
-            <a:ext cx="733864" cy="274320"/>
+            <a:off x="7924800" y="6356350"/>
+            <a:ext cx="762000" cy="365125"/>
           </a:xfrm>
           <a:prstGeom prst="rect">
             <a:avLst/>
           </a:prstGeom>
         </p:spPr>
         <p:txBody>
-          <a:bodyPr vert="horz" bIns="0" rtlCol="0" anchor="b"/>
+          <a:bodyPr vert="horz" lIns="0" tIns="0" rIns="0" bIns="0" anchor="b"/>
           <a:lstStyle>
             <a:lvl1pPr algn="r" eaLnBrk="1" latinLnBrk="0" hangingPunct="1">
               <a:defRPr kumimoji="0" sz="1200">
                 <a:solidFill>
-                  <a:schemeClr val="tx1">
-                    <a:tint val="95000"/>
+                  <a:schemeClr val="tx2">
+                    <a:shade val="90000"/>
                   </a:schemeClr>
                 </a:solidFill>
               </a:defRPr>
             </a:lvl1pPr>
-            <a:extLst/>
           </a:lstStyle>
           <a:p>
             <a:fld id="{725C68B6-61C2-468F-89AB-4B9F7531AA68}" type="slidenum">
@@ -3500,21 +3337,235 @@
           </a:p>
         </p:txBody>
       </p:sp>
+      <p:grpSp>
+        <p:nvGrpSpPr>
+          <p:cNvPr id="2" name="Группа 1"/>
+          <p:cNvGrpSpPr/>
+          <p:nvPr/>
+        </p:nvGrpSpPr>
+        <p:grpSpPr>
+          <a:xfrm>
+            <a:off x="-19017" y="202408"/>
+            <a:ext cx="9180548" cy="649224"/>
+            <a:chOff x="-19045" y="216550"/>
+            <a:chExt cx="9180548" cy="649224"/>
+          </a:xfrm>
+        </p:grpSpPr>
+        <p:sp>
+          <p:nvSpPr>
+            <p:cNvPr id="12" name="Полилиния 11"/>
+            <p:cNvSpPr>
+              <a:spLocks/>
+            </p:cNvSpPr>
+            <p:nvPr/>
+          </p:nvSpPr>
+          <p:spPr bwMode="auto">
+            <a:xfrm rot="21435692">
+              <a:off x="-19045" y="216550"/>
+              <a:ext cx="9163050" cy="649224"/>
+            </a:xfrm>
+            <a:custGeom>
+              <a:avLst>
+                <a:gd name="A1" fmla="val 0"/>
+                <a:gd name="A2" fmla="val 0"/>
+                <a:gd name="A3" fmla="val 0"/>
+                <a:gd name="A4" fmla="val 0"/>
+                <a:gd name="A5" fmla="val 0"/>
+                <a:gd name="A6" fmla="val 0"/>
+                <a:gd name="A7" fmla="val 0"/>
+                <a:gd name="A8" fmla="val 0"/>
+              </a:avLst>
+              <a:gdLst/>
+              <a:ahLst/>
+              <a:cxnLst>
+                <a:cxn ang="0">
+                  <a:pos x="0" y="966"/>
+                </a:cxn>
+                <a:cxn ang="0">
+                  <a:pos x="1608" y="282"/>
+                </a:cxn>
+                <a:cxn ang="0">
+                  <a:pos x="4110" y="1008"/>
+                </a:cxn>
+                <a:cxn ang="0">
+                  <a:pos x="5772" y="0"/>
+                </a:cxn>
+              </a:cxnLst>
+              <a:rect l="0" t="0" r="0" b="0"/>
+              <a:pathLst>
+                <a:path w="5772" h="1055">
+                  <a:moveTo>
+                    <a:pt x="0" y="966"/>
+                  </a:moveTo>
+                  <a:cubicBezTo>
+                    <a:pt x="282" y="738"/>
+                    <a:pt x="923" y="275"/>
+                    <a:pt x="1608" y="282"/>
+                  </a:cubicBezTo>
+                  <a:cubicBezTo>
+                    <a:pt x="2293" y="289"/>
+                    <a:pt x="3416" y="1055"/>
+                    <a:pt x="4110" y="1008"/>
+                  </a:cubicBezTo>
+                  <a:cubicBezTo>
+                    <a:pt x="4804" y="961"/>
+                    <a:pt x="5426" y="210"/>
+                    <a:pt x="5772" y="0"/>
+                  </a:cubicBezTo>
+                </a:path>
+              </a:pathLst>
+            </a:custGeom>
+            <a:noFill/>
+            <a:ln w="10795" cap="flat" cmpd="sng" algn="ctr">
+              <a:gradFill>
+                <a:gsLst>
+                  <a:gs pos="74000">
+                    <a:schemeClr val="accent3">
+                      <a:shade val="75000"/>
+                    </a:schemeClr>
+                  </a:gs>
+                  <a:gs pos="86000">
+                    <a:schemeClr val="tx1">
+                      <a:alpha val="29000"/>
+                    </a:schemeClr>
+                  </a:gs>
+                  <a:gs pos="16000">
+                    <a:schemeClr val="accent2">
+                      <a:shade val="75000"/>
+                      <a:alpha val="56000"/>
+                    </a:schemeClr>
+                  </a:gs>
+                </a:gsLst>
+                <a:lin ang="5400000" scaled="1"/>
+              </a:gradFill>
+              <a:prstDash val="solid"/>
+              <a:round/>
+              <a:headEnd type="none" w="med" len="med"/>
+              <a:tailEnd type="none" w="med" len="med"/>
+            </a:ln>
+            <a:effectLst/>
+          </p:spPr>
+          <p:txBody>
+            <a:bodyPr vert="horz" wrap="square" lIns="91440" tIns="45720" rIns="91440" bIns="45720" anchor="t" compatLnSpc="1"/>
+            <a:lstStyle/>
+            <a:p>
+              <a:endParaRPr kumimoji="0" lang="en-US"/>
+            </a:p>
+          </p:txBody>
+        </p:sp>
+        <p:sp>
+          <p:nvSpPr>
+            <p:cNvPr id="13" name="Полилиния 12"/>
+            <p:cNvSpPr>
+              <a:spLocks/>
+            </p:cNvSpPr>
+            <p:nvPr/>
+          </p:nvSpPr>
+          <p:spPr bwMode="auto">
+            <a:xfrm rot="21435692">
+              <a:off x="-14309" y="290003"/>
+              <a:ext cx="9175812" cy="530352"/>
+            </a:xfrm>
+            <a:custGeom>
+              <a:avLst>
+                <a:gd name="A1" fmla="val 0"/>
+                <a:gd name="A2" fmla="val 0"/>
+                <a:gd name="A3" fmla="val 0"/>
+                <a:gd name="A4" fmla="val 0"/>
+                <a:gd name="A5" fmla="val 0"/>
+                <a:gd name="A6" fmla="val 0"/>
+                <a:gd name="A7" fmla="val 0"/>
+                <a:gd name="A8" fmla="val 0"/>
+              </a:avLst>
+              <a:gdLst/>
+              <a:ahLst/>
+              <a:cxnLst>
+                <a:cxn ang="0">
+                  <a:pos x="0" y="732"/>
+                </a:cxn>
+                <a:cxn ang="0">
+                  <a:pos x="1638" y="228"/>
+                </a:cxn>
+                <a:cxn ang="0">
+                  <a:pos x="4122" y="816"/>
+                </a:cxn>
+                <a:cxn ang="0">
+                  <a:pos x="5766" y="0"/>
+                </a:cxn>
+              </a:cxnLst>
+              <a:rect l="0" t="0" r="0" b="0"/>
+              <a:pathLst>
+                <a:path w="5766" h="854">
+                  <a:moveTo>
+                    <a:pt x="0" y="732"/>
+                  </a:moveTo>
+                  <a:cubicBezTo>
+                    <a:pt x="273" y="647"/>
+                    <a:pt x="951" y="214"/>
+                    <a:pt x="1638" y="228"/>
+                  </a:cubicBezTo>
+                  <a:cubicBezTo>
+                    <a:pt x="2325" y="242"/>
+                    <a:pt x="3434" y="854"/>
+                    <a:pt x="4122" y="816"/>
+                  </a:cubicBezTo>
+                  <a:cubicBezTo>
+                    <a:pt x="4810" y="778"/>
+                    <a:pt x="5424" y="170"/>
+                    <a:pt x="5766" y="0"/>
+                  </a:cubicBezTo>
+                </a:path>
+              </a:pathLst>
+            </a:custGeom>
+            <a:noFill/>
+            <a:ln w="9525" cap="flat" cmpd="sng" algn="ctr">
+              <a:gradFill>
+                <a:gsLst>
+                  <a:gs pos="74000">
+                    <a:schemeClr val="accent4"/>
+                  </a:gs>
+                  <a:gs pos="44000">
+                    <a:schemeClr val="accent1"/>
+                  </a:gs>
+                  <a:gs pos="33000">
+                    <a:schemeClr val="accent2">
+                      <a:alpha val="56000"/>
+                    </a:schemeClr>
+                  </a:gs>
+                </a:gsLst>
+                <a:lin ang="5400000" scaled="1"/>
+              </a:gradFill>
+              <a:prstDash val="solid"/>
+              <a:round/>
+              <a:headEnd type="none" w="med" len="med"/>
+              <a:tailEnd type="none" w="med" len="med"/>
+            </a:ln>
+            <a:effectLst/>
+          </p:spPr>
+          <p:txBody>
+            <a:bodyPr vert="horz" wrap="square" lIns="91440" tIns="45720" rIns="91440" bIns="45720" anchor="t" compatLnSpc="1"/>
+            <a:lstStyle/>
+            <a:p>
+              <a:endParaRPr kumimoji="0" lang="en-US"/>
+            </a:p>
+          </p:txBody>
+        </p:sp>
+      </p:grpSp>
     </p:spTree>
   </p:cSld>
   <p:clrMap bg1="lt1" tx1="dk1" bg2="lt2" tx2="dk2" accent1="accent1" accent2="accent2" accent3="accent3" accent4="accent4" accent5="accent5" accent6="accent6" hlink="hlink" folHlink="folHlink"/>
   <p:sldLayoutIdLst>
-    <p:sldLayoutId id="2147483673" r:id="rId1"/>
-    <p:sldLayoutId id="2147483674" r:id="rId2"/>
-    <p:sldLayoutId id="2147483675" r:id="rId3"/>
-    <p:sldLayoutId id="2147483676" r:id="rId4"/>
-    <p:sldLayoutId id="2147483677" r:id="rId5"/>
-    <p:sldLayoutId id="2147483678" r:id="rId6"/>
-    <p:sldLayoutId id="2147483679" r:id="rId7"/>
-    <p:sldLayoutId id="2147483680" r:id="rId8"/>
-    <p:sldLayoutId id="2147483681" r:id="rId9"/>
-    <p:sldLayoutId id="2147483682" r:id="rId10"/>
-    <p:sldLayoutId id="2147483683" r:id="rId11"/>
+    <p:sldLayoutId id="2147483685" r:id="rId1"/>
+    <p:sldLayoutId id="2147483686" r:id="rId2"/>
+    <p:sldLayoutId id="2147483687" r:id="rId3"/>
+    <p:sldLayoutId id="2147483688" r:id="rId4"/>
+    <p:sldLayoutId id="2147483689" r:id="rId5"/>
+    <p:sldLayoutId id="2147483690" r:id="rId6"/>
+    <p:sldLayoutId id="2147483691" r:id="rId7"/>
+    <p:sldLayoutId id="2147483692" r:id="rId8"/>
+    <p:sldLayoutId id="2147483693" r:id="rId9"/>
+    <p:sldLayoutId id="2147483694" r:id="rId10"/>
+    <p:sldLayoutId id="2147483695" r:id="rId11"/>
   </p:sldLayoutIdLst>
   <p:txStyles>
     <p:titleStyle>
@@ -3523,11 +3574,12 @@
           <a:spcPct val="0"/>
         </a:spcBef>
         <a:buNone/>
-        <a:defRPr kumimoji="0" sz="4500" b="1" kern="1200">
+        <a:defRPr kumimoji="0" sz="5000" b="0" kern="1200">
+          <a:ln>
+            <a:noFill/>
+          </a:ln>
           <a:solidFill>
-            <a:schemeClr val="accent1">
-              <a:satMod val="150000"/>
-            </a:schemeClr>
+            <a:schemeClr val="tx2"/>
           </a:solidFill>
           <a:effectLst/>
           <a:latin typeface="+mj-lt"/>
@@ -3535,20 +3587,19 @@
           <a:cs typeface="+mj-cs"/>
         </a:defRPr>
       </a:lvl1pPr>
-      <a:extLst/>
     </p:titleStyle>
     <p:bodyStyle>
-      <a:lvl1pPr marL="438912" indent="-320040" algn="l" rtl="0" eaLnBrk="1" latinLnBrk="0" hangingPunct="1">
+      <a:lvl1pPr marL="274320" indent="-274320" algn="l" rtl="0" eaLnBrk="1" latinLnBrk="0" hangingPunct="1">
         <a:spcBef>
-          <a:spcPts val="0"/>
+          <a:spcPct val="20000"/>
         </a:spcBef>
         <a:buClr>
-          <a:schemeClr val="accent1"/>
+          <a:schemeClr val="accent3"/>
         </a:buClr>
-        <a:buSzPct val="80000"/>
+        <a:buSzPct val="95000"/>
         <a:buFont typeface="Wingdings 2"/>
-        <a:buChar char=""/>
-        <a:defRPr kumimoji="0" sz="3200" kern="1200">
+        <a:buChar char=""/>
+        <a:defRPr kumimoji="0" sz="2600" kern="1200">
           <a:solidFill>
             <a:schemeClr val="tx1"/>
           </a:solidFill>
@@ -3557,17 +3608,17 @@
           <a:cs typeface="+mn-cs"/>
         </a:defRPr>
       </a:lvl1pPr>
-      <a:lvl2pPr marL="731520" indent="-274320" algn="l" rtl="0" eaLnBrk="1" latinLnBrk="0" hangingPunct="1">
+      <a:lvl2pPr marL="640080" indent="-246888" algn="l" rtl="0" eaLnBrk="1" latinLnBrk="0" hangingPunct="1">
         <a:spcBef>
           <a:spcPct val="20000"/>
         </a:spcBef>
         <a:buClr>
-          <a:schemeClr val="accent2"/>
+          <a:schemeClr val="accent1"/>
         </a:buClr>
-        <a:buSzPct val="90000"/>
-        <a:buFont typeface="Wingdings"/>
-        <a:buChar char=""/>
-        <a:defRPr kumimoji="0" sz="2800" kern="1200">
+        <a:buSzPct val="85000"/>
+        <a:buFont typeface="Wingdings 2"/>
+        <a:buChar char=""/>
+        <a:defRPr kumimoji="0" sz="2400" kern="1200">
           <a:solidFill>
             <a:schemeClr val="tx1"/>
           </a:solidFill>
@@ -3576,16 +3627,17 @@
           <a:cs typeface="+mn-cs"/>
         </a:defRPr>
       </a:lvl2pPr>
-      <a:lvl3pPr marL="996696" indent="-228600" algn="l" rtl="0" eaLnBrk="1" latinLnBrk="0" hangingPunct="1">
+      <a:lvl3pPr marL="914400" indent="-246888" algn="l" rtl="0" eaLnBrk="1" latinLnBrk="0" hangingPunct="1">
         <a:spcBef>
           <a:spcPct val="20000"/>
         </a:spcBef>
         <a:buClr>
-          <a:schemeClr val="accent3"/>
+          <a:schemeClr val="accent2"/>
         </a:buClr>
-        <a:buFont typeface="Arial"/>
-        <a:buChar char="▪"/>
-        <a:defRPr kumimoji="0" sz="2400" kern="1200">
+        <a:buSzPct val="70000"/>
+        <a:buFont typeface="Wingdings 2"/>
+        <a:buChar char=""/>
+        <a:defRPr kumimoji="0" sz="2100" kern="1200">
           <a:solidFill>
             <a:schemeClr val="tx1"/>
           </a:solidFill>
@@ -3594,15 +3646,16 @@
           <a:cs typeface="+mn-cs"/>
         </a:defRPr>
       </a:lvl3pPr>
-      <a:lvl4pPr marL="1216152" indent="-182880" algn="l" rtl="0" eaLnBrk="1" latinLnBrk="0" hangingPunct="1">
+      <a:lvl4pPr marL="1188720" indent="-210312" algn="l" rtl="0" eaLnBrk="1" latinLnBrk="0" hangingPunct="1">
         <a:spcBef>
           <a:spcPct val="20000"/>
         </a:spcBef>
         <a:buClr>
-          <a:schemeClr val="accent4"/>
+          <a:schemeClr val="accent3"/>
         </a:buClr>
-        <a:buFont typeface="Arial"/>
-        <a:buChar char="▪"/>
+        <a:buSzPct val="65000"/>
+        <a:buFont typeface="Wingdings 2"/>
+        <a:buChar char=""/>
         <a:defRPr kumimoji="0" sz="2000" kern="1200">
           <a:solidFill>
             <a:schemeClr val="tx1"/>
@@ -3612,16 +3665,17 @@
           <a:cs typeface="+mn-cs"/>
         </a:defRPr>
       </a:lvl4pPr>
-      <a:lvl5pPr marL="1426464" indent="-182880" algn="l" rtl="0" eaLnBrk="1" latinLnBrk="0" hangingPunct="1">
+      <a:lvl5pPr marL="1463040" indent="-210312" algn="l" rtl="0" eaLnBrk="1" latinLnBrk="0" hangingPunct="1">
         <a:spcBef>
           <a:spcPct val="20000"/>
         </a:spcBef>
         <a:buClr>
-          <a:schemeClr val="accent5"/>
+          <a:schemeClr val="accent4"/>
         </a:buClr>
-        <a:buFont typeface="Wingdings 3"/>
-        <a:buChar char=""/>
-        <a:defRPr kumimoji="0" lang="en-US" sz="2000" kern="1200" smtClean="0">
+        <a:buSzPct val="65000"/>
+        <a:buFont typeface="Wingdings 2"/>
+        <a:buChar char=""/>
+        <a:defRPr kumimoji="0" sz="2000" kern="1200">
           <a:solidFill>
             <a:schemeClr val="tx1"/>
           </a:solidFill>
@@ -3630,17 +3684,17 @@
           <a:cs typeface="+mn-cs"/>
         </a:defRPr>
       </a:lvl5pPr>
-      <a:lvl6pPr marL="1627632" indent="-182880" algn="l" rtl="0" eaLnBrk="1" latinLnBrk="0" hangingPunct="1">
+      <a:lvl6pPr marL="1737360" indent="-210312" algn="l" rtl="0" eaLnBrk="1" latinLnBrk="0" hangingPunct="1">
         <a:spcBef>
           <a:spcPct val="20000"/>
         </a:spcBef>
         <a:buClr>
-          <a:schemeClr val="accent6"/>
+          <a:schemeClr val="accent5"/>
         </a:buClr>
-        <a:buSzPct val="100000"/>
+        <a:buSzPct val="80000"/>
         <a:buFont typeface="Wingdings 2"/>
-        <a:buChar char=""/>
-        <a:defRPr kumimoji="0" sz="2000" kern="1200">
+        <a:buChar char=""/>
+        <a:defRPr kumimoji="0" sz="1800" kern="1200">
           <a:solidFill>
             <a:schemeClr val="tx1"/>
           </a:solidFill>
@@ -3649,17 +3703,17 @@
           <a:cs typeface="+mn-cs"/>
         </a:defRPr>
       </a:lvl6pPr>
-      <a:lvl7pPr marL="1828800" indent="-182880" algn="l" rtl="0" eaLnBrk="1" latinLnBrk="0" hangingPunct="1">
+      <a:lvl7pPr marL="1920240" indent="-182880" algn="l" rtl="0" eaLnBrk="1" latinLnBrk="0" hangingPunct="1">
         <a:spcBef>
           <a:spcPct val="20000"/>
         </a:spcBef>
         <a:buClr>
-          <a:schemeClr val="accent1"/>
+          <a:schemeClr val="accent6"/>
         </a:buClr>
-        <a:buSzPct val="100000"/>
+        <a:buSzPct val="80000"/>
         <a:buFont typeface="Wingdings 2"/>
-        <a:buChar char=""/>
-        <a:defRPr kumimoji="0" sz="1800" kern="1200">
+        <a:buChar char=""/>
+        <a:defRPr kumimoji="0" sz="1600" kern="1200" baseline="0">
           <a:solidFill>
             <a:schemeClr val="tx1"/>
           </a:solidFill>
@@ -3668,16 +3722,15 @@
           <a:cs typeface="+mn-cs"/>
         </a:defRPr>
       </a:lvl7pPr>
-      <a:lvl8pPr marL="2029968" indent="-182880" algn="l" rtl="0" eaLnBrk="1" latinLnBrk="0" hangingPunct="1">
+      <a:lvl8pPr marL="2194560" indent="-182880" algn="l" rtl="0" eaLnBrk="1" latinLnBrk="0" hangingPunct="1">
         <a:spcBef>
           <a:spcPct val="20000"/>
         </a:spcBef>
         <a:buClr>
-          <a:schemeClr val="accent2"/>
+          <a:schemeClr val="tx2"/>
         </a:buClr>
-        <a:buFont typeface="Wingdings 2" pitchFamily="18" charset="2"/>
-        <a:buChar char=""/>
-        <a:defRPr kumimoji="0" sz="1800" kern="1200">
+        <a:buChar char="•"/>
+        <a:defRPr kumimoji="0" sz="1600" kern="1200">
           <a:solidFill>
             <a:schemeClr val="tx1"/>
           </a:solidFill>
@@ -3686,16 +3739,16 @@
           <a:cs typeface="+mn-cs"/>
         </a:defRPr>
       </a:lvl8pPr>
-      <a:lvl9pPr marL="2231136" indent="-182880" algn="l" rtl="0" eaLnBrk="1" latinLnBrk="0" hangingPunct="1">
+      <a:lvl9pPr marL="2468880" indent="-182880" algn="l" rtl="0" eaLnBrk="1" latinLnBrk="0" hangingPunct="1">
         <a:spcBef>
           <a:spcPct val="20000"/>
         </a:spcBef>
         <a:buClr>
-          <a:schemeClr val="accent3"/>
+          <a:schemeClr val="tx2"/>
         </a:buClr>
-        <a:buFont typeface="Wingdings 2" pitchFamily="18" charset="2"/>
-        <a:buChar char=""/>
-        <a:defRPr kumimoji="0" sz="1800" kern="1200" baseline="0">
+        <a:buFontTx/>
+        <a:buChar char="•"/>
+        <a:defRPr kumimoji="0" sz="1400" kern="1200" baseline="0">
           <a:solidFill>
             <a:schemeClr val="tx1"/>
           </a:solidFill>
@@ -3704,7 +3757,6 @@
           <a:cs typeface="+mn-cs"/>
         </a:defRPr>
       </a:lvl9pPr>
-      <a:extLst/>
     </p:bodyStyle>
     <p:otherStyle>
       <a:lvl1pPr marL="0" algn="l" rtl="0" eaLnBrk="1" latinLnBrk="0" hangingPunct="1">
@@ -3797,7 +3849,6 @@
           <a:cs typeface="+mn-cs"/>
         </a:defRPr>
       </a:lvl9pPr>
-      <a:extLst/>
     </p:otherStyle>
   </p:txStyles>
 </p:sldMaster>
@@ -3858,7 +3909,11 @@
           <a:bodyPr/>
           <a:lstStyle/>
           <a:p>
-            <a:endParaRPr lang="ru-RU"/>
+            <a:r>
+              <a:rPr lang="en-US" dirty="0" err="1" smtClean="0"/>
+              <a:t>sgsfgsf</a:t>
+            </a:r>
+            <a:endParaRPr lang="ru-RU" dirty="0"/>
           </a:p>
         </p:txBody>
       </p:sp>
@@ -3871,9 +3926,9 @@
 </file>
 
 <file path=ppt/theme/theme1.xml><?xml version="1.0" encoding="utf-8"?>
-<a:theme xmlns:a="http://schemas.openxmlformats.org/drawingml/2006/main" name="Модульная">
+<a:theme xmlns:a="http://schemas.openxmlformats.org/drawingml/2006/main" name="Поток">
   <a:themeElements>
-    <a:clrScheme name="Модульная">
+    <a:clrScheme name="Поток">
       <a:dk1>
         <a:sysClr val="windowText" lastClr="000000"/>
       </a:dk1>
@@ -3881,48 +3936,48 @@
         <a:sysClr val="window" lastClr="FFFFFF"/>
       </a:lt1>
       <a:dk2>
-        <a:srgbClr val="5A6378"/>
+        <a:srgbClr val="04617B"/>
       </a:dk2>
       <a:lt2>
-        <a:srgbClr val="D4D4D6"/>
+        <a:srgbClr val="DBF5F9"/>
       </a:lt2>
       <a:accent1>
-        <a:srgbClr val="F0AD00"/>
+        <a:srgbClr val="0F6FC6"/>
       </a:accent1>
       <a:accent2>
-        <a:srgbClr val="60B5CC"/>
+        <a:srgbClr val="009DD9"/>
       </a:accent2>
       <a:accent3>
-        <a:srgbClr val="E66C7D"/>
+        <a:srgbClr val="0BD0D9"/>
       </a:accent3>
       <a:accent4>
-        <a:srgbClr val="6BB76D"/>
+        <a:srgbClr val="10CF9B"/>
       </a:accent4>
       <a:accent5>
-        <a:srgbClr val="E88651"/>
+        <a:srgbClr val="7CCA62"/>
       </a:accent5>
       <a:accent6>
-        <a:srgbClr val="C64847"/>
+        <a:srgbClr val="A5C249"/>
       </a:accent6>
       <a:hlink>
-        <a:srgbClr val="168BBA"/>
+        <a:srgbClr val="E2D700"/>
       </a:hlink>
       <a:folHlink>
-        <a:srgbClr val="680000"/>
+        <a:srgbClr val="85DFD0"/>
       </a:folHlink>
     </a:clrScheme>
-    <a:fontScheme name="Модульная">
+    <a:fontScheme name="Поток">
       <a:majorFont>
-        <a:latin typeface="Corbel"/>
+        <a:latin typeface="Calibri"/>
         <a:ea typeface=""/>
         <a:cs typeface=""/>
-        <a:font script="Jpan" typeface="HGｺﾞｼｯｸM"/>
-        <a:font script="Hang" typeface="HY엽서L"/>
-        <a:font script="Hans" typeface="华文楷体"/>
-        <a:font script="Hant" typeface="新細明體"/>
-        <a:font script="Arab" typeface="Tahoma"/>
-        <a:font script="Hebr" typeface="Miriam"/>
-        <a:font script="Thai" typeface="DilleniaUPC"/>
+        <a:font script="Jpan" typeface="ＭＳ Ｐゴシック"/>
+        <a:font script="Hang" typeface="HY중고딕"/>
+        <a:font script="Hans" typeface="隶书"/>
+        <a:font script="Hant" typeface="微軟正黑體"/>
+        <a:font script="Arab" typeface="Traditional Arabic"/>
+        <a:font script="Hebr" typeface="Arial"/>
+        <a:font script="Thai" typeface="Cordia New"/>
         <a:font script="Ethi" typeface="Nyala"/>
         <a:font script="Beng" typeface="Vrinda"/>
         <a:font script="Gujr" typeface="Shruti"/>
@@ -3947,20 +4002,20 @@
         <a:font script="Uigh" typeface="Microsoft Uighur"/>
       </a:majorFont>
       <a:minorFont>
-        <a:latin typeface="Corbel"/>
+        <a:latin typeface="Constantia"/>
         <a:ea typeface=""/>
         <a:cs typeface=""/>
-        <a:font script="Jpan" typeface="HGｺﾞｼｯｸM"/>
-        <a:font script="Hang" typeface="HY엽서L"/>
-        <a:font script="Hans" typeface="华文楷体"/>
+        <a:font script="Jpan" typeface="HGP明朝E"/>
+        <a:font script="Hang" typeface="HY신명조"/>
+        <a:font script="Hans" typeface="宋体"/>
         <a:font script="Hant" typeface="新細明體"/>
-        <a:font script="Arab" typeface="Tahoma"/>
-        <a:font script="Hebr" typeface="Miriam"/>
-        <a:font script="Thai" typeface="DilleniaUPC"/>
+        <a:font script="Arab" typeface="Majalla UI"/>
+        <a:font script="Hebr" typeface="David"/>
+        <a:font script="Thai" typeface="Browallia New"/>
         <a:font script="Ethi" typeface="Nyala"/>
         <a:font script="Beng" typeface="Vrinda"/>
         <a:font script="Gujr" typeface="Shruti"/>
-        <a:font script="Khmr" typeface="DaunPenh"/>
+        <a:font script="Khmr" typeface="MoolBoran"/>
         <a:font script="Knda" typeface="Tunga"/>
         <a:font script="Guru" typeface="Raavi"/>
         <a:font script="Cans" typeface="Euphemia"/>
@@ -3977,11 +4032,11 @@
         <a:font script="Laoo" typeface="DokChampa"/>
         <a:font script="Sinh" typeface="Iskoola Pota"/>
         <a:font script="Mong" typeface="Mongolian Baiti"/>
-        <a:font script="Viet" typeface="Arial"/>
+        <a:font script="Viet" typeface="Times New Roman"/>
         <a:font script="Uigh" typeface="Microsoft Uighur"/>
       </a:minorFont>
     </a:fontScheme>
-    <a:fmtScheme name="Модульная">
+    <a:fmtScheme name="Поток">
       <a:fillStyleLst>
         <a:solidFill>
           <a:schemeClr val="phClr"/>
@@ -3990,66 +4045,77 @@
           <a:gsLst>
             <a:gs pos="0">
               <a:schemeClr val="phClr">
-                <a:tint val="50000"/>
-                <a:satMod val="300000"/>
+                <a:tint val="70000"/>
+                <a:satMod val="130000"/>
               </a:schemeClr>
             </a:gs>
-            <a:gs pos="35000">
+            <a:gs pos="43000">
               <a:schemeClr val="phClr">
-                <a:tint val="37000"/>
-                <a:satMod val="300000"/>
+                <a:tint val="44000"/>
+                <a:satMod val="165000"/>
+              </a:schemeClr>
+            </a:gs>
+            <a:gs pos="93000">
+              <a:schemeClr val="phClr">
+                <a:tint val="15000"/>
+                <a:satMod val="165000"/>
               </a:schemeClr>
             </a:gs>
             <a:gs pos="100000">
               <a:schemeClr val="phClr">
-                <a:tint val="15000"/>
-                <a:satMod val="350000"/>
+                <a:tint val="5000"/>
+                <a:satMod val="250000"/>
               </a:schemeClr>
             </a:gs>
           </a:gsLst>
-          <a:lin ang="16200000" scaled="1"/>
+          <a:path path="circle">
+            <a:fillToRect l="50000" t="130000" r="50000" b="-30000"/>
+          </a:path>
         </a:gradFill>
         <a:gradFill rotWithShape="1">
           <a:gsLst>
             <a:gs pos="0">
               <a:schemeClr val="phClr">
-                <a:shade val="47500"/>
-                <a:satMod val="137000"/>
+                <a:tint val="98000"/>
+                <a:shade val="25000"/>
+                <a:satMod val="250000"/>
               </a:schemeClr>
             </a:gs>
-            <a:gs pos="55000">
+            <a:gs pos="68000">
               <a:schemeClr val="phClr">
-                <a:shade val="69000"/>
-                <a:satMod val="137000"/>
+                <a:tint val="86000"/>
+                <a:satMod val="115000"/>
               </a:schemeClr>
             </a:gs>
             <a:gs pos="100000">
               <a:schemeClr val="phClr">
-                <a:shade val="98000"/>
-                <a:satMod val="137000"/>
+                <a:tint val="50000"/>
+                <a:satMod val="150000"/>
               </a:schemeClr>
             </a:gs>
           </a:gsLst>
-          <a:lin ang="16200000" scaled="0"/>
+          <a:path path="circle">
+            <a:fillToRect l="50000" t="130000" r="50000" b="-30000"/>
+          </a:path>
         </a:gradFill>
       </a:fillStyleLst>
       <a:lnStyleLst>
-        <a:ln w="6350" cap="rnd" cmpd="sng" algn="ctr">
+        <a:ln w="9525" cap="flat" cmpd="sng" algn="ctr">
           <a:solidFill>
             <a:schemeClr val="phClr">
-              <a:shade val="95000"/>
-              <a:satMod val="105000"/>
+              <a:shade val="50000"/>
+              <a:satMod val="103000"/>
             </a:schemeClr>
           </a:solidFill>
           <a:prstDash val="solid"/>
         </a:ln>
-        <a:ln w="48000" cap="flat" cmpd="thickThin" algn="ctr">
+        <a:ln w="25400" cap="flat" cmpd="sng" algn="ctr">
           <a:solidFill>
             <a:schemeClr val="phClr"/>
           </a:solidFill>
           <a:prstDash val="solid"/>
         </a:ln>
-        <a:ln w="48500" cap="flat" cmpd="thickThin" algn="ctr">
+        <a:ln w="38100" cap="flat" cmpd="sng" algn="ctr">
           <a:solidFill>
             <a:schemeClr val="phClr"/>
           </a:solidFill>
@@ -4059,40 +4125,46 @@
       <a:effectStyleLst>
         <a:effectStyle>
           <a:effectLst>
-            <a:outerShdw blurRad="45000" dist="25000" dir="5400000" rotWithShape="0">
-              <a:srgbClr val="000000">
-                <a:alpha val="38000"/>
-              </a:srgbClr>
+            <a:outerShdw blurRad="57150" dist="38100" dir="5400000" algn="ctr" rotWithShape="0">
+              <a:schemeClr val="phClr">
+                <a:shade val="9000"/>
+                <a:satMod val="105000"/>
+                <a:alpha val="48000"/>
+              </a:schemeClr>
             </a:outerShdw>
           </a:effectLst>
         </a:effectStyle>
         <a:effectStyle>
           <a:effectLst>
-            <a:outerShdw blurRad="39000" dist="25400" dir="5400000" rotWithShape="0">
-              <a:srgbClr val="000000">
-                <a:alpha val="38000"/>
-              </a:srgbClr>
+            <a:outerShdw blurRad="57150" dist="38100" dir="5400000" algn="ctr" rotWithShape="0">
+              <a:schemeClr val="phClr">
+                <a:shade val="9000"/>
+                <a:satMod val="105000"/>
+                <a:alpha val="48000"/>
+              </a:schemeClr>
             </a:outerShdw>
           </a:effectLst>
         </a:effectStyle>
         <a:effectStyle>
           <a:effectLst>
-            <a:outerShdw blurRad="39000" dist="25400" dir="5400000" rotWithShape="0">
-              <a:srgbClr val="000000">
-                <a:alpha val="38000"/>
-              </a:srgbClr>
+            <a:outerShdw blurRad="57150" dist="38100" dir="5400000" algn="ctr" rotWithShape="0">
+              <a:schemeClr val="phClr">
+                <a:shade val="9000"/>
+                <a:satMod val="105000"/>
+                <a:alpha val="48000"/>
+              </a:schemeClr>
             </a:outerShdw>
           </a:effectLst>
           <a:scene3d>
             <a:camera prst="orthographicFront" fov="0">
               <a:rot lat="0" lon="0" rev="0"/>
             </a:camera>
-            <a:lightRig rig="threePt" dir="t">
-              <a:rot lat="0" lon="0" rev="1800000"/>
+            <a:lightRig rig="glow" dir="tl">
+              <a:rot lat="0" lon="0" rev="900000"/>
             </a:lightRig>
           </a:scene3d>
-          <a:sp3d prstMaterial="matte">
-            <a:bevelT h="20000"/>
+          <a:sp3d prstMaterial="powder">
+            <a:bevelT w="25400" h="38100"/>
           </a:sp3d>
         </a:effectStyle>
       </a:effectStyleLst>
@@ -4104,46 +4176,41 @@
           <a:gsLst>
             <a:gs pos="0">
               <a:schemeClr val="phClr">
-                <a:tint val="48000"/>
-                <a:satMod val="300000"/>
+                <a:tint val="80000"/>
+                <a:satMod val="400000"/>
               </a:schemeClr>
             </a:gs>
-            <a:gs pos="12000">
+            <a:gs pos="25000">
               <a:schemeClr val="phClr">
-                <a:tint val="48000"/>
-                <a:satMod val="300000"/>
-              </a:schemeClr>
-            </a:gs>
-            <a:gs pos="20000">
-              <a:schemeClr val="phClr">
-                <a:tint val="49000"/>
-                <a:satMod val="300000"/>
+                <a:tint val="83000"/>
+                <a:satMod val="320000"/>
               </a:schemeClr>
             </a:gs>
             <a:gs pos="100000">
               <a:schemeClr val="phClr">
-                <a:shade val="30000"/>
+                <a:shade val="15000"/>
+                <a:satMod val="320000"/>
               </a:schemeClr>
             </a:gs>
           </a:gsLst>
           <a:path path="circle">
-            <a:fillToRect l="10000" t="-25000" r="10000" b="125000"/>
+            <a:fillToRect l="10000" t="110000" r="10000" b="100000"/>
           </a:path>
         </a:gradFill>
         <a:blipFill>
           <a:blip xmlns:r="http://schemas.openxmlformats.org/officeDocument/2006/relationships" r:embed="rId1">
             <a:duotone>
               <a:schemeClr val="phClr">
-                <a:shade val="75000"/>
-                <a:satMod val="105000"/>
+                <a:shade val="90000"/>
+                <a:satMod val="150000"/>
               </a:schemeClr>
               <a:schemeClr val="phClr">
-                <a:tint val="95000"/>
-                <a:satMod val="105000"/>
+                <a:tint val="88000"/>
+                <a:satMod val="150000"/>
               </a:schemeClr>
             </a:duotone>
           </a:blip>
-          <a:tile tx="0" ty="0" sx="38000" sy="38000" flip="none" algn="tl"/>
+          <a:tile tx="0" ty="0" sx="65000" sy="65000" flip="none" algn="tl"/>
         </a:blipFill>
       </a:bgFillStyleLst>
     </a:fmtScheme>

</xml_diff>